<commit_message>
Organized code in base of which module belongs
</commit_message>
<xml_diff>
--- a/Slides/05-Managing Data.pptx
+++ b/Slides/05-Managing Data.pptx
@@ -5,7 +5,7 @@
     <p:sldMasterId id="2147483699" r:id="rId1"/>
   </p:sldMasterIdLst>
   <p:notesMasterIdLst>
-    <p:notesMasterId r:id="rId44"/>
+    <p:notesMasterId r:id="rId46"/>
   </p:notesMasterIdLst>
   <p:sldIdLst>
     <p:sldId id="289" r:id="rId2"/>
@@ -50,6 +50,8 @@
     <p:sldId id="345" r:id="rId41"/>
     <p:sldId id="349" r:id="rId42"/>
     <p:sldId id="348" r:id="rId43"/>
+    <p:sldId id="350" r:id="rId44"/>
+    <p:sldId id="351" r:id="rId45"/>
   </p:sldIdLst>
   <p:sldSz cx="12192000" cy="6858000"/>
   <p:notesSz cx="6858000" cy="9144000"/>
@@ -244,7 +246,7 @@
           <a:p>
             <a:fld id="{A7EBB5C6-BC59-4AE5-A6E0-8DD141F892FA}" type="datetimeFigureOut">
               <a:rPr lang="en-US" smtClean="0"/>
-              <a:t>10/16/2022</a:t>
+              <a:t>10/17/2022</a:t>
             </a:fld>
             <a:endParaRPr lang="en-US"/>
           </a:p>
@@ -31223,7 +31225,36 @@
                 <a:effectLst/>
                 <a:latin typeface="+mj-lt"/>
               </a:rPr>
-              <a:t>An object that represent a  control that lets us navigate from top to bottom of result set (result obtained).</a:t>
+              <a:t>API which allow us </a:t>
+            </a:r>
+            <a:r>
+              <a:rPr lang="en-US" dirty="0">
+                <a:solidFill>
+                  <a:srgbClr val="000000"/>
+                </a:solidFill>
+                <a:latin typeface="+mj-lt"/>
+              </a:rPr>
+              <a:t>to </a:t>
+            </a:r>
+            <a:r>
+              <a:rPr lang="en-US" sz="1800" b="0" i="0" u="none" strike="noStrike" dirty="0">
+                <a:solidFill>
+                  <a:srgbClr val="000000"/>
+                </a:solidFill>
+                <a:effectLst/>
+                <a:latin typeface="+mj-lt"/>
+              </a:rPr>
+              <a:t>navigate from top to bottom of result set (result </a:t>
+            </a:r>
+            <a:r>
+              <a:rPr lang="en-US" sz="1800" b="0" i="0" u="none" strike="noStrike">
+                <a:solidFill>
+                  <a:srgbClr val="000000"/>
+                </a:solidFill>
+                <a:effectLst/>
+                <a:latin typeface="+mj-lt"/>
+              </a:rPr>
+              <a:t>obtained).</a:t>
             </a:r>
             <a:endParaRPr lang="en-US" b="0" dirty="0">
               <a:effectLst/>
@@ -31805,6 +31836,2808 @@
     <p:extLst>
       <p:ext uri="{BB962C8B-B14F-4D97-AF65-F5344CB8AC3E}">
         <p14:creationId xmlns:p14="http://schemas.microsoft.com/office/powerpoint/2010/main" val="1381485944"/>
+      </p:ext>
+    </p:extLst>
+  </p:cSld>
+  <p:clrMapOvr>
+    <a:masterClrMapping/>
+  </p:clrMapOvr>
+</p:sld>
+</file>
+
+<file path=ppt/slides/slide43.xml><?xml version="1.0" encoding="utf-8"?>
+<p:sld xmlns:a="http://schemas.openxmlformats.org/drawingml/2006/main" xmlns:r="http://schemas.openxmlformats.org/officeDocument/2006/relationships" xmlns:p="http://schemas.openxmlformats.org/presentationml/2006/main">
+  <p:cSld>
+    <p:spTree>
+      <p:nvGrpSpPr>
+        <p:cNvPr id="1" name=""/>
+        <p:cNvGrpSpPr/>
+        <p:nvPr/>
+      </p:nvGrpSpPr>
+      <p:grpSpPr>
+        <a:xfrm>
+          <a:off x="0" y="0"/>
+          <a:ext cx="0" cy="0"/>
+          <a:chOff x="0" y="0"/>
+          <a:chExt cx="0" cy="0"/>
+        </a:xfrm>
+      </p:grpSpPr>
+      <p:sp>
+        <p:nvSpPr>
+          <p:cNvPr id="2" name="Titolo 1">
+            <a:extLst>
+              <a:ext uri="{FF2B5EF4-FFF2-40B4-BE49-F238E27FC236}">
+                <a16:creationId xmlns:a16="http://schemas.microsoft.com/office/drawing/2014/main" id="{598A467D-E742-C8F5-F232-388A3CB65E94}"/>
+              </a:ext>
+            </a:extLst>
+          </p:cNvPr>
+          <p:cNvSpPr>
+            <a:spLocks noGrp="1"/>
+          </p:cNvSpPr>
+          <p:nvPr>
+            <p:ph type="title"/>
+          </p:nvPr>
+        </p:nvSpPr>
+        <p:spPr/>
+        <p:txBody>
+          <a:bodyPr/>
+          <a:lstStyle/>
+          <a:p>
+            <a:r>
+              <a:rPr lang="en-US" dirty="0"/>
+              <a:t>Implementation</a:t>
+            </a:r>
+          </a:p>
+        </p:txBody>
+      </p:sp>
+      <p:sp>
+        <p:nvSpPr>
+          <p:cNvPr id="7" name="Rectangle 2">
+            <a:extLst>
+              <a:ext uri="{FF2B5EF4-FFF2-40B4-BE49-F238E27FC236}">
+                <a16:creationId xmlns:a16="http://schemas.microsoft.com/office/drawing/2014/main" id="{3F12CA73-7362-9CF2-A345-889BC07F6F70}"/>
+              </a:ext>
+            </a:extLst>
+          </p:cNvPr>
+          <p:cNvSpPr>
+            <a:spLocks noChangeArrowheads="1"/>
+          </p:cNvSpPr>
+          <p:nvPr/>
+        </p:nvSpPr>
+        <p:spPr bwMode="auto">
+          <a:xfrm>
+            <a:off x="2075468" y="1647981"/>
+            <a:ext cx="8286161" cy="5001369"/>
+          </a:xfrm>
+          <a:prstGeom prst="rect">
+            <a:avLst/>
+          </a:prstGeom>
+          <a:noFill/>
+          <a:ln>
+            <a:noFill/>
+          </a:ln>
+          <a:effectLst/>
+        </p:spPr>
+        <p:txBody>
+          <a:bodyPr vert="horz" wrap="square" lIns="91440" tIns="45720" rIns="91440" bIns="45720" numCol="1" anchor="ctr" anchorCtr="0" compatLnSpc="1">
+            <a:prstTxWarp prst="textNoShape">
+              <a:avLst/>
+            </a:prstTxWarp>
+            <a:spAutoFit/>
+          </a:bodyPr>
+          <a:lstStyle/>
+          <a:p>
+            <a:pPr marL="0" marR="0" lvl="0" indent="0" algn="l" defTabSz="914400" rtl="0" eaLnBrk="0" fontAlgn="base" latinLnBrk="0" hangingPunct="0">
+              <a:lnSpc>
+                <a:spcPct val="100000"/>
+              </a:lnSpc>
+              <a:spcBef>
+                <a:spcPct val="0"/>
+              </a:spcBef>
+              <a:spcAft>
+                <a:spcPct val="0"/>
+              </a:spcAft>
+              <a:buClrTx/>
+              <a:buSzTx/>
+              <a:buFontTx/>
+              <a:buNone/>
+              <a:tabLst/>
+            </a:pPr>
+            <a:r>
+              <a:rPr kumimoji="0" lang="en-US" altLang="en-US" sz="1100" b="1" i="0" u="none" strike="noStrike" cap="none" normalizeH="0" baseline="0" dirty="0">
+                <a:ln>
+                  <a:noFill/>
+                </a:ln>
+                <a:solidFill>
+                  <a:srgbClr val="CC7832"/>
+                </a:solidFill>
+                <a:effectLst/>
+                <a:latin typeface="JetBrains Mono"/>
+              </a:rPr>
+              <a:t>public </a:t>
+            </a:r>
+            <a:r>
+              <a:rPr kumimoji="0" lang="en-US" altLang="en-US" sz="1100" b="1" i="0" u="none" strike="noStrike" cap="none" normalizeH="0" baseline="0" dirty="0">
+                <a:ln>
+                  <a:noFill/>
+                </a:ln>
+                <a:solidFill>
+                  <a:srgbClr val="A9B7C6"/>
+                </a:solidFill>
+                <a:effectLst/>
+                <a:latin typeface="JetBrains Mono"/>
+              </a:rPr>
+              <a:t>String </a:t>
+            </a:r>
+            <a:r>
+              <a:rPr kumimoji="0" lang="en-US" altLang="en-US" sz="1100" b="1" i="0" u="none" strike="noStrike" cap="none" normalizeH="0" baseline="0" dirty="0" err="1">
+                <a:ln>
+                  <a:noFill/>
+                </a:ln>
+                <a:solidFill>
+                  <a:srgbClr val="FFC66D"/>
+                </a:solidFill>
+                <a:effectLst/>
+                <a:latin typeface="JetBrains Mono"/>
+              </a:rPr>
+              <a:t>getData</a:t>
+            </a:r>
+            <a:r>
+              <a:rPr kumimoji="0" lang="en-US" altLang="en-US" sz="1100" b="1" i="0" u="none" strike="noStrike" cap="none" normalizeH="0" baseline="0" dirty="0">
+                <a:ln>
+                  <a:noFill/>
+                </a:ln>
+                <a:solidFill>
+                  <a:srgbClr val="A9B7C6"/>
+                </a:solidFill>
+                <a:effectLst/>
+                <a:latin typeface="JetBrains Mono"/>
+              </a:rPr>
+              <a:t>(String name){</a:t>
+            </a:r>
+            <a:br>
+              <a:rPr kumimoji="0" lang="en-US" altLang="en-US" sz="1100" b="1" i="0" u="none" strike="noStrike" cap="none" normalizeH="0" baseline="0" dirty="0">
+                <a:ln>
+                  <a:noFill/>
+                </a:ln>
+                <a:solidFill>
+                  <a:srgbClr val="A9B7C6"/>
+                </a:solidFill>
+                <a:effectLst/>
+                <a:latin typeface="JetBrains Mono"/>
+              </a:rPr>
+            </a:br>
+            <a:r>
+              <a:rPr kumimoji="0" lang="en-US" altLang="en-US" sz="1100" b="1" i="0" u="none" strike="noStrike" cap="none" normalizeH="0" baseline="0" dirty="0">
+                <a:ln>
+                  <a:noFill/>
+                </a:ln>
+                <a:solidFill>
+                  <a:srgbClr val="A9B7C6"/>
+                </a:solidFill>
+                <a:effectLst/>
+                <a:latin typeface="JetBrains Mono"/>
+              </a:rPr>
+              <a:t>    </a:t>
+            </a:r>
+            <a:r>
+              <a:rPr kumimoji="0" lang="en-US" altLang="en-US" sz="1100" b="1" i="0" u="none" strike="noStrike" cap="none" normalizeH="0" baseline="0" dirty="0" err="1">
+                <a:ln>
+                  <a:noFill/>
+                </a:ln>
+                <a:solidFill>
+                  <a:srgbClr val="A9B7C6"/>
+                </a:solidFill>
+                <a:effectLst/>
+                <a:latin typeface="JetBrains Mono"/>
+              </a:rPr>
+              <a:t>SQLiteDatabase</a:t>
+            </a:r>
+            <a:r>
+              <a:rPr kumimoji="0" lang="en-US" altLang="en-US" sz="1100" b="1" i="0" u="none" strike="noStrike" cap="none" normalizeH="0" baseline="0" dirty="0">
+                <a:ln>
+                  <a:noFill/>
+                </a:ln>
+                <a:solidFill>
+                  <a:srgbClr val="A9B7C6"/>
+                </a:solidFill>
+                <a:effectLst/>
+                <a:latin typeface="JetBrains Mono"/>
+              </a:rPr>
+              <a:t> </a:t>
+            </a:r>
+            <a:r>
+              <a:rPr kumimoji="0" lang="en-US" altLang="en-US" sz="1100" b="1" i="0" u="none" strike="noStrike" cap="none" normalizeH="0" baseline="0" dirty="0" err="1">
+                <a:ln>
+                  <a:noFill/>
+                </a:ln>
+                <a:solidFill>
+                  <a:srgbClr val="A9B7C6"/>
+                </a:solidFill>
+                <a:effectLst/>
+                <a:latin typeface="JetBrains Mono"/>
+              </a:rPr>
+              <a:t>db</a:t>
+            </a:r>
+            <a:r>
+              <a:rPr kumimoji="0" lang="en-US" altLang="en-US" sz="1100" b="1" i="0" u="none" strike="noStrike" cap="none" normalizeH="0" baseline="0" dirty="0">
+                <a:ln>
+                  <a:noFill/>
+                </a:ln>
+                <a:solidFill>
+                  <a:srgbClr val="A9B7C6"/>
+                </a:solidFill>
+                <a:effectLst/>
+                <a:latin typeface="JetBrains Mono"/>
+              </a:rPr>
+              <a:t>=</a:t>
+            </a:r>
+            <a:r>
+              <a:rPr kumimoji="0" lang="en-US" altLang="en-US" sz="1100" b="1" i="0" u="none" strike="noStrike" cap="none" normalizeH="0" baseline="0" dirty="0" err="1">
+                <a:ln>
+                  <a:noFill/>
+                </a:ln>
+                <a:solidFill>
+                  <a:srgbClr val="9876AA"/>
+                </a:solidFill>
+                <a:effectLst/>
+                <a:latin typeface="JetBrains Mono"/>
+              </a:rPr>
+              <a:t>sqLiteHelper</a:t>
+            </a:r>
+            <a:r>
+              <a:rPr kumimoji="0" lang="en-US" altLang="en-US" sz="1100" b="1" i="0" u="none" strike="noStrike" cap="none" normalizeH="0" baseline="0" dirty="0" err="1">
+                <a:ln>
+                  <a:noFill/>
+                </a:ln>
+                <a:solidFill>
+                  <a:srgbClr val="A9B7C6"/>
+                </a:solidFill>
+                <a:effectLst/>
+                <a:latin typeface="JetBrains Mono"/>
+              </a:rPr>
+              <a:t>.getWritableDatabase</a:t>
+            </a:r>
+            <a:r>
+              <a:rPr kumimoji="0" lang="en-US" altLang="en-US" sz="1100" b="1" i="0" u="none" strike="noStrike" cap="none" normalizeH="0" baseline="0" dirty="0">
+                <a:ln>
+                  <a:noFill/>
+                </a:ln>
+                <a:solidFill>
+                  <a:srgbClr val="A9B7C6"/>
+                </a:solidFill>
+                <a:effectLst/>
+                <a:latin typeface="JetBrains Mono"/>
+              </a:rPr>
+              <a:t>()</a:t>
+            </a:r>
+            <a:r>
+              <a:rPr kumimoji="0" lang="en-US" altLang="en-US" sz="1100" b="1" i="0" u="none" strike="noStrike" cap="none" normalizeH="0" baseline="0" dirty="0">
+                <a:ln>
+                  <a:noFill/>
+                </a:ln>
+                <a:solidFill>
+                  <a:srgbClr val="CC7832"/>
+                </a:solidFill>
+                <a:effectLst/>
+                <a:latin typeface="JetBrains Mono"/>
+              </a:rPr>
+              <a:t>;</a:t>
+            </a:r>
+            <a:br>
+              <a:rPr kumimoji="0" lang="en-US" altLang="en-US" sz="1100" b="1" i="0" u="none" strike="noStrike" cap="none" normalizeH="0" baseline="0" dirty="0">
+                <a:ln>
+                  <a:noFill/>
+                </a:ln>
+                <a:solidFill>
+                  <a:srgbClr val="CC7832"/>
+                </a:solidFill>
+                <a:effectLst/>
+                <a:latin typeface="JetBrains Mono"/>
+              </a:rPr>
+            </a:br>
+            <a:r>
+              <a:rPr kumimoji="0" lang="en-US" altLang="en-US" sz="1100" b="1" i="0" u="none" strike="noStrike" cap="none" normalizeH="0" baseline="0" dirty="0">
+                <a:ln>
+                  <a:noFill/>
+                </a:ln>
+                <a:solidFill>
+                  <a:srgbClr val="CC7832"/>
+                </a:solidFill>
+                <a:effectLst/>
+                <a:latin typeface="JetBrains Mono"/>
+              </a:rPr>
+              <a:t>    </a:t>
+            </a:r>
+            <a:r>
+              <a:rPr kumimoji="0" lang="en-US" altLang="en-US" sz="1100" b="1" i="0" u="none" strike="noStrike" cap="none" normalizeH="0" baseline="0" dirty="0">
+                <a:ln>
+                  <a:noFill/>
+                </a:ln>
+                <a:solidFill>
+                  <a:srgbClr val="A9B7C6"/>
+                </a:solidFill>
+                <a:effectLst/>
+                <a:latin typeface="JetBrains Mono"/>
+              </a:rPr>
+              <a:t>String columns[]={</a:t>
+            </a:r>
+            <a:r>
+              <a:rPr kumimoji="0" lang="en-US" altLang="en-US" sz="1100" b="1" i="0" u="none" strike="noStrike" cap="none" normalizeH="0" baseline="0" dirty="0" err="1">
+                <a:ln>
+                  <a:noFill/>
+                </a:ln>
+                <a:solidFill>
+                  <a:srgbClr val="9876AA"/>
+                </a:solidFill>
+                <a:effectLst/>
+                <a:latin typeface="JetBrains Mono"/>
+              </a:rPr>
+              <a:t>sqLiteHelper</a:t>
+            </a:r>
+            <a:r>
+              <a:rPr kumimoji="0" lang="en-US" altLang="en-US" sz="1100" b="1" i="0" u="none" strike="noStrike" cap="none" normalizeH="0" baseline="0" dirty="0" err="1">
+                <a:ln>
+                  <a:noFill/>
+                </a:ln>
+                <a:solidFill>
+                  <a:srgbClr val="A9B7C6"/>
+                </a:solidFill>
+                <a:effectLst/>
+                <a:latin typeface="JetBrains Mono"/>
+              </a:rPr>
+              <a:t>.</a:t>
+            </a:r>
+            <a:r>
+              <a:rPr kumimoji="0" lang="en-US" altLang="en-US" sz="1100" b="1" i="1" u="none" strike="noStrike" cap="none" normalizeH="0" baseline="0" dirty="0" err="1">
+                <a:ln>
+                  <a:noFill/>
+                </a:ln>
+                <a:solidFill>
+                  <a:srgbClr val="9876AA"/>
+                </a:solidFill>
+                <a:effectLst/>
+                <a:latin typeface="JetBrains Mono"/>
+              </a:rPr>
+              <a:t>NAME</a:t>
+            </a:r>
+            <a:r>
+              <a:rPr kumimoji="0" lang="en-US" altLang="en-US" sz="1100" b="1" i="0" u="none" strike="noStrike" cap="none" normalizeH="0" baseline="0" dirty="0" err="1">
+                <a:ln>
+                  <a:noFill/>
+                </a:ln>
+                <a:solidFill>
+                  <a:srgbClr val="CC7832"/>
+                </a:solidFill>
+                <a:effectLst/>
+                <a:latin typeface="JetBrains Mono"/>
+              </a:rPr>
+              <a:t>,</a:t>
+            </a:r>
+            <a:r>
+              <a:rPr kumimoji="0" lang="en-US" altLang="en-US" sz="1100" b="1" i="0" u="none" strike="noStrike" cap="none" normalizeH="0" baseline="0" dirty="0" err="1">
+                <a:ln>
+                  <a:noFill/>
+                </a:ln>
+                <a:solidFill>
+                  <a:srgbClr val="9876AA"/>
+                </a:solidFill>
+                <a:effectLst/>
+                <a:latin typeface="JetBrains Mono"/>
+              </a:rPr>
+              <a:t>sqLiteHelper</a:t>
+            </a:r>
+            <a:r>
+              <a:rPr kumimoji="0" lang="en-US" altLang="en-US" sz="1100" b="1" i="0" u="none" strike="noStrike" cap="none" normalizeH="0" baseline="0" dirty="0" err="1">
+                <a:ln>
+                  <a:noFill/>
+                </a:ln>
+                <a:solidFill>
+                  <a:srgbClr val="A9B7C6"/>
+                </a:solidFill>
+                <a:effectLst/>
+                <a:latin typeface="JetBrains Mono"/>
+              </a:rPr>
+              <a:t>.</a:t>
+            </a:r>
+            <a:r>
+              <a:rPr kumimoji="0" lang="en-US" altLang="en-US" sz="1100" b="1" i="1" u="none" strike="noStrike" cap="none" normalizeH="0" baseline="0" dirty="0" err="1">
+                <a:ln>
+                  <a:noFill/>
+                </a:ln>
+                <a:solidFill>
+                  <a:srgbClr val="9876AA"/>
+                </a:solidFill>
+                <a:effectLst/>
+                <a:latin typeface="JetBrains Mono"/>
+              </a:rPr>
+              <a:t>PASSWORD</a:t>
+            </a:r>
+            <a:r>
+              <a:rPr kumimoji="0" lang="en-US" altLang="en-US" sz="1100" b="1" i="0" u="none" strike="noStrike" cap="none" normalizeH="0" baseline="0" dirty="0">
+                <a:ln>
+                  <a:noFill/>
+                </a:ln>
+                <a:solidFill>
+                  <a:srgbClr val="A9B7C6"/>
+                </a:solidFill>
+                <a:effectLst/>
+                <a:latin typeface="JetBrains Mono"/>
+              </a:rPr>
+              <a:t>}</a:t>
+            </a:r>
+            <a:r>
+              <a:rPr kumimoji="0" lang="en-US" altLang="en-US" sz="1100" b="1" i="0" u="none" strike="noStrike" cap="none" normalizeH="0" baseline="0" dirty="0">
+                <a:ln>
+                  <a:noFill/>
+                </a:ln>
+                <a:solidFill>
+                  <a:srgbClr val="CC7832"/>
+                </a:solidFill>
+                <a:effectLst/>
+                <a:latin typeface="JetBrains Mono"/>
+              </a:rPr>
+              <a:t>;</a:t>
+            </a:r>
+            <a:br>
+              <a:rPr kumimoji="0" lang="en-US" altLang="en-US" sz="1100" b="1" i="0" u="none" strike="noStrike" cap="none" normalizeH="0" baseline="0" dirty="0">
+                <a:ln>
+                  <a:noFill/>
+                </a:ln>
+                <a:solidFill>
+                  <a:srgbClr val="CC7832"/>
+                </a:solidFill>
+                <a:effectLst/>
+                <a:latin typeface="JetBrains Mono"/>
+              </a:rPr>
+            </a:br>
+            <a:r>
+              <a:rPr kumimoji="0" lang="en-US" altLang="en-US" sz="1100" b="1" i="0" u="none" strike="noStrike" cap="none" normalizeH="0" baseline="0" dirty="0">
+                <a:ln>
+                  <a:noFill/>
+                </a:ln>
+                <a:solidFill>
+                  <a:srgbClr val="CC7832"/>
+                </a:solidFill>
+                <a:effectLst/>
+                <a:latin typeface="JetBrains Mono"/>
+              </a:rPr>
+              <a:t>    </a:t>
+            </a:r>
+            <a:r>
+              <a:rPr kumimoji="0" lang="en-US" altLang="en-US" sz="1100" b="1" i="1" u="none" strike="noStrike" cap="none" normalizeH="0" baseline="0" dirty="0">
+                <a:ln>
+                  <a:noFill/>
+                </a:ln>
+                <a:solidFill>
+                  <a:srgbClr val="629755"/>
+                </a:solidFill>
+                <a:effectLst/>
+                <a:latin typeface="JetBrains Mono"/>
+              </a:rPr>
+              <a:t>/**1st way**/</a:t>
+            </a:r>
+            <a:br>
+              <a:rPr kumimoji="0" lang="en-US" altLang="en-US" sz="1100" b="1" i="1" u="none" strike="noStrike" cap="none" normalizeH="0" baseline="0" dirty="0">
+                <a:ln>
+                  <a:noFill/>
+                </a:ln>
+                <a:solidFill>
+                  <a:srgbClr val="629755"/>
+                </a:solidFill>
+                <a:effectLst/>
+                <a:latin typeface="JetBrains Mono"/>
+              </a:rPr>
+            </a:br>
+            <a:r>
+              <a:rPr kumimoji="0" lang="en-US" altLang="en-US" sz="1100" b="1" i="1" u="none" strike="noStrike" cap="none" normalizeH="0" baseline="0" dirty="0">
+                <a:ln>
+                  <a:noFill/>
+                </a:ln>
+                <a:solidFill>
+                  <a:srgbClr val="629755"/>
+                </a:solidFill>
+                <a:effectLst/>
+                <a:latin typeface="JetBrains Mono"/>
+              </a:rPr>
+              <a:t>    </a:t>
+            </a:r>
+            <a:r>
+              <a:rPr kumimoji="0" lang="en-US" altLang="en-US" sz="1100" b="1" i="0" u="none" strike="noStrike" cap="none" normalizeH="0" baseline="0" dirty="0">
+                <a:ln>
+                  <a:noFill/>
+                </a:ln>
+                <a:solidFill>
+                  <a:srgbClr val="A9B7C6"/>
+                </a:solidFill>
+                <a:effectLst/>
+                <a:latin typeface="JetBrains Mono"/>
+              </a:rPr>
+              <a:t>String </a:t>
+            </a:r>
+            <a:r>
+              <a:rPr kumimoji="0" lang="en-US" altLang="en-US" sz="1100" b="1" i="0" u="none" strike="noStrike" cap="none" normalizeH="0" baseline="0" dirty="0" err="1">
+                <a:ln>
+                  <a:noFill/>
+                </a:ln>
+                <a:solidFill>
+                  <a:srgbClr val="A9B7C6"/>
+                </a:solidFill>
+                <a:effectLst/>
+                <a:latin typeface="JetBrains Mono"/>
+              </a:rPr>
+              <a:t>whereCondition</a:t>
+            </a:r>
+            <a:r>
+              <a:rPr kumimoji="0" lang="en-US" altLang="en-US" sz="1100" b="1" i="0" u="none" strike="noStrike" cap="none" normalizeH="0" baseline="0" dirty="0">
+                <a:ln>
+                  <a:noFill/>
+                </a:ln>
+                <a:solidFill>
+                  <a:srgbClr val="A9B7C6"/>
+                </a:solidFill>
+                <a:effectLst/>
+                <a:latin typeface="JetBrains Mono"/>
+              </a:rPr>
+              <a:t>=columns[</a:t>
+            </a:r>
+            <a:r>
+              <a:rPr kumimoji="0" lang="en-US" altLang="en-US" sz="1100" b="1" i="0" u="none" strike="noStrike" cap="none" normalizeH="0" baseline="0" dirty="0">
+                <a:ln>
+                  <a:noFill/>
+                </a:ln>
+                <a:solidFill>
+                  <a:srgbClr val="6897BB"/>
+                </a:solidFill>
+                <a:effectLst/>
+                <a:latin typeface="JetBrains Mono"/>
+              </a:rPr>
+              <a:t>0</a:t>
+            </a:r>
+            <a:r>
+              <a:rPr kumimoji="0" lang="en-US" altLang="en-US" sz="1100" b="1" i="0" u="none" strike="noStrike" cap="none" normalizeH="0" baseline="0" dirty="0">
+                <a:ln>
+                  <a:noFill/>
+                </a:ln>
+                <a:solidFill>
+                  <a:srgbClr val="A9B7C6"/>
+                </a:solidFill>
+                <a:effectLst/>
+                <a:latin typeface="JetBrains Mono"/>
+              </a:rPr>
+              <a:t>]+</a:t>
+            </a:r>
+            <a:r>
+              <a:rPr kumimoji="0" lang="en-US" altLang="en-US" sz="1100" b="1" i="0" u="none" strike="noStrike" cap="none" normalizeH="0" baseline="0" dirty="0">
+                <a:ln>
+                  <a:noFill/>
+                </a:ln>
+                <a:solidFill>
+                  <a:srgbClr val="6A8759"/>
+                </a:solidFill>
+                <a:effectLst/>
+                <a:latin typeface="JetBrains Mono"/>
+              </a:rPr>
+              <a:t>"=</a:t>
+            </a:r>
+            <a:r>
+              <a:rPr kumimoji="0" lang="en-US" altLang="en-US" sz="1100" b="1" i="0" u="none" strike="noStrike" cap="none" normalizeH="0" baseline="0" dirty="0">
+                <a:ln>
+                  <a:noFill/>
+                </a:ln>
+                <a:solidFill>
+                  <a:srgbClr val="CC7832"/>
+                </a:solidFill>
+                <a:effectLst/>
+                <a:latin typeface="JetBrains Mono"/>
+              </a:rPr>
+              <a:t>\"</a:t>
+            </a:r>
+            <a:r>
+              <a:rPr kumimoji="0" lang="en-US" altLang="en-US" sz="1100" b="1" i="0" u="none" strike="noStrike" cap="none" normalizeH="0" baseline="0" dirty="0">
+                <a:ln>
+                  <a:noFill/>
+                </a:ln>
+                <a:solidFill>
+                  <a:srgbClr val="6A8759"/>
+                </a:solidFill>
+                <a:effectLst/>
+                <a:latin typeface="JetBrains Mono"/>
+              </a:rPr>
+              <a:t>"</a:t>
+            </a:r>
+            <a:r>
+              <a:rPr kumimoji="0" lang="en-US" altLang="en-US" sz="1100" b="1" i="0" u="none" strike="noStrike" cap="none" normalizeH="0" baseline="0" dirty="0">
+                <a:ln>
+                  <a:noFill/>
+                </a:ln>
+                <a:solidFill>
+                  <a:srgbClr val="A9B7C6"/>
+                </a:solidFill>
+                <a:effectLst/>
+                <a:latin typeface="JetBrains Mono"/>
+              </a:rPr>
+              <a:t>+name+</a:t>
+            </a:r>
+            <a:r>
+              <a:rPr kumimoji="0" lang="en-US" altLang="en-US" sz="1100" b="1" i="0" u="none" strike="noStrike" cap="none" normalizeH="0" baseline="0" dirty="0">
+                <a:ln>
+                  <a:noFill/>
+                </a:ln>
+                <a:solidFill>
+                  <a:srgbClr val="6A8759"/>
+                </a:solidFill>
+                <a:effectLst/>
+                <a:latin typeface="JetBrains Mono"/>
+              </a:rPr>
+              <a:t>"</a:t>
+            </a:r>
+            <a:r>
+              <a:rPr kumimoji="0" lang="en-US" altLang="en-US" sz="1100" b="1" i="0" u="none" strike="noStrike" cap="none" normalizeH="0" baseline="0" dirty="0">
+                <a:ln>
+                  <a:noFill/>
+                </a:ln>
+                <a:solidFill>
+                  <a:srgbClr val="CC7832"/>
+                </a:solidFill>
+                <a:effectLst/>
+                <a:latin typeface="JetBrains Mono"/>
+              </a:rPr>
+              <a:t>\"</a:t>
+            </a:r>
+            <a:r>
+              <a:rPr kumimoji="0" lang="en-US" altLang="en-US" sz="1100" b="1" i="0" u="none" strike="noStrike" cap="none" normalizeH="0" baseline="0" dirty="0">
+                <a:ln>
+                  <a:noFill/>
+                </a:ln>
+                <a:solidFill>
+                  <a:srgbClr val="6A8759"/>
+                </a:solidFill>
+                <a:effectLst/>
+                <a:latin typeface="JetBrains Mono"/>
+              </a:rPr>
+              <a:t>"</a:t>
+            </a:r>
+            <a:r>
+              <a:rPr kumimoji="0" lang="en-US" altLang="en-US" sz="1100" b="1" i="0" u="none" strike="noStrike" cap="none" normalizeH="0" baseline="0" dirty="0">
+                <a:ln>
+                  <a:noFill/>
+                </a:ln>
+                <a:solidFill>
+                  <a:srgbClr val="CC7832"/>
+                </a:solidFill>
+                <a:effectLst/>
+                <a:latin typeface="JetBrains Mono"/>
+              </a:rPr>
+              <a:t>;</a:t>
+            </a:r>
+            <a:br>
+              <a:rPr kumimoji="0" lang="en-US" altLang="en-US" sz="1100" b="1" i="0" u="none" strike="noStrike" cap="none" normalizeH="0" baseline="0" dirty="0">
+                <a:ln>
+                  <a:noFill/>
+                </a:ln>
+                <a:solidFill>
+                  <a:srgbClr val="CC7832"/>
+                </a:solidFill>
+                <a:effectLst/>
+                <a:latin typeface="JetBrains Mono"/>
+              </a:rPr>
+            </a:br>
+            <a:r>
+              <a:rPr kumimoji="0" lang="en-US" altLang="en-US" sz="1100" b="1" i="0" u="none" strike="noStrike" cap="none" normalizeH="0" baseline="0" dirty="0">
+                <a:ln>
+                  <a:noFill/>
+                </a:ln>
+                <a:solidFill>
+                  <a:srgbClr val="CC7832"/>
+                </a:solidFill>
+                <a:effectLst/>
+                <a:latin typeface="JetBrains Mono"/>
+              </a:rPr>
+              <a:t>    </a:t>
+            </a:r>
+            <a:r>
+              <a:rPr kumimoji="0" lang="en-US" altLang="en-US" sz="1100" b="1" i="0" u="none" strike="noStrike" cap="none" normalizeH="0" baseline="0" dirty="0">
+                <a:ln>
+                  <a:noFill/>
+                </a:ln>
+                <a:solidFill>
+                  <a:srgbClr val="A9B7C6"/>
+                </a:solidFill>
+                <a:effectLst/>
+                <a:latin typeface="JetBrains Mono"/>
+              </a:rPr>
+              <a:t>Cursor cursor=</a:t>
+            </a:r>
+            <a:r>
+              <a:rPr kumimoji="0" lang="en-US" altLang="en-US" sz="1100" b="1" i="0" u="none" strike="noStrike" cap="none" normalizeH="0" baseline="0" dirty="0" err="1">
+                <a:ln>
+                  <a:noFill/>
+                </a:ln>
+                <a:solidFill>
+                  <a:srgbClr val="A9B7C6"/>
+                </a:solidFill>
+                <a:effectLst/>
+                <a:latin typeface="JetBrains Mono"/>
+              </a:rPr>
+              <a:t>db.query</a:t>
+            </a:r>
+            <a:r>
+              <a:rPr kumimoji="0" lang="en-US" altLang="en-US" sz="1100" b="1" i="0" u="none" strike="noStrike" cap="none" normalizeH="0" baseline="0" dirty="0">
+                <a:ln>
+                  <a:noFill/>
+                </a:ln>
+                <a:solidFill>
+                  <a:srgbClr val="A9B7C6"/>
+                </a:solidFill>
+                <a:effectLst/>
+                <a:latin typeface="JetBrains Mono"/>
+              </a:rPr>
+              <a:t>(</a:t>
+            </a:r>
+            <a:r>
+              <a:rPr kumimoji="0" lang="en-US" altLang="en-US" sz="1100" b="1" i="0" u="none" strike="noStrike" cap="none" normalizeH="0" baseline="0" dirty="0">
+                <a:ln>
+                  <a:noFill/>
+                </a:ln>
+                <a:solidFill>
+                  <a:srgbClr val="9876AA"/>
+                </a:solidFill>
+                <a:effectLst/>
+                <a:latin typeface="JetBrains Mono"/>
+              </a:rPr>
+              <a:t>sqLiteHelper</a:t>
+            </a:r>
+            <a:r>
+              <a:rPr kumimoji="0" lang="en-US" altLang="en-US" sz="1100" b="1" i="0" u="none" strike="noStrike" cap="none" normalizeH="0" baseline="0" dirty="0">
+                <a:ln>
+                  <a:noFill/>
+                </a:ln>
+                <a:solidFill>
+                  <a:srgbClr val="A9B7C6"/>
+                </a:solidFill>
+                <a:effectLst/>
+                <a:latin typeface="JetBrains Mono"/>
+              </a:rPr>
+              <a:t>.</a:t>
+            </a:r>
+            <a:r>
+              <a:rPr kumimoji="0" lang="en-US" altLang="en-US" sz="1100" b="1" i="1" u="none" strike="noStrike" cap="none" normalizeH="0" baseline="0" dirty="0">
+                <a:ln>
+                  <a:noFill/>
+                </a:ln>
+                <a:solidFill>
+                  <a:srgbClr val="9876AA"/>
+                </a:solidFill>
+                <a:effectLst/>
+                <a:latin typeface="JetBrains Mono"/>
+              </a:rPr>
+              <a:t>TABLE_NAME</a:t>
+            </a:r>
+            <a:r>
+              <a:rPr kumimoji="0" lang="en-US" altLang="en-US" sz="1100" b="1" i="0" u="none" strike="noStrike" cap="none" normalizeH="0" baseline="0" dirty="0">
+                <a:ln>
+                  <a:noFill/>
+                </a:ln>
+                <a:solidFill>
+                  <a:srgbClr val="CC7832"/>
+                </a:solidFill>
+                <a:effectLst/>
+                <a:latin typeface="JetBrains Mono"/>
+              </a:rPr>
+              <a:t>,</a:t>
+            </a:r>
+            <a:r>
+              <a:rPr kumimoji="0" lang="en-US" altLang="en-US" sz="1100" b="1" i="0" u="none" strike="noStrike" cap="none" normalizeH="0" baseline="0" dirty="0">
+                <a:ln>
+                  <a:noFill/>
+                </a:ln>
+                <a:solidFill>
+                  <a:srgbClr val="A9B7C6"/>
+                </a:solidFill>
+                <a:effectLst/>
+                <a:latin typeface="JetBrains Mono"/>
+              </a:rPr>
+              <a:t>columns</a:t>
+            </a:r>
+            <a:r>
+              <a:rPr kumimoji="0" lang="en-US" altLang="en-US" sz="1100" b="1" i="0" u="none" strike="noStrike" cap="none" normalizeH="0" baseline="0" dirty="0">
+                <a:ln>
+                  <a:noFill/>
+                </a:ln>
+                <a:solidFill>
+                  <a:srgbClr val="CC7832"/>
+                </a:solidFill>
+                <a:effectLst/>
+                <a:latin typeface="JetBrains Mono"/>
+              </a:rPr>
+              <a:t>,</a:t>
+            </a:r>
+            <a:r>
+              <a:rPr kumimoji="0" lang="en-US" altLang="en-US" sz="1100" b="1" i="0" u="none" strike="noStrike" cap="none" normalizeH="0" baseline="0" dirty="0">
+                <a:ln>
+                  <a:noFill/>
+                </a:ln>
+                <a:solidFill>
+                  <a:srgbClr val="A9B7C6"/>
+                </a:solidFill>
+                <a:effectLst/>
+                <a:latin typeface="JetBrains Mono"/>
+              </a:rPr>
+              <a:t>whereCondition</a:t>
+            </a:r>
+            <a:r>
+              <a:rPr kumimoji="0" lang="en-US" altLang="en-US" sz="1100" b="1" i="0" u="none" strike="noStrike" cap="none" normalizeH="0" baseline="0" dirty="0">
+                <a:ln>
+                  <a:noFill/>
+                </a:ln>
+                <a:solidFill>
+                  <a:srgbClr val="CC7832"/>
+                </a:solidFill>
+                <a:effectLst/>
+                <a:latin typeface="JetBrains Mono"/>
+              </a:rPr>
+              <a:t>,null,null,null,null</a:t>
+            </a:r>
+            <a:r>
+              <a:rPr kumimoji="0" lang="en-US" altLang="en-US" sz="1100" b="1" i="0" u="none" strike="noStrike" cap="none" normalizeH="0" baseline="0" dirty="0">
+                <a:ln>
+                  <a:noFill/>
+                </a:ln>
+                <a:solidFill>
+                  <a:srgbClr val="A9B7C6"/>
+                </a:solidFill>
+                <a:effectLst/>
+                <a:latin typeface="JetBrains Mono"/>
+              </a:rPr>
+              <a:t>)</a:t>
+            </a:r>
+            <a:r>
+              <a:rPr kumimoji="0" lang="en-US" altLang="en-US" sz="1100" b="1" i="0" u="none" strike="noStrike" cap="none" normalizeH="0" baseline="0" dirty="0">
+                <a:ln>
+                  <a:noFill/>
+                </a:ln>
+                <a:solidFill>
+                  <a:srgbClr val="CC7832"/>
+                </a:solidFill>
+                <a:effectLst/>
+                <a:latin typeface="JetBrains Mono"/>
+              </a:rPr>
+              <a:t>;</a:t>
+            </a:r>
+            <a:br>
+              <a:rPr kumimoji="0" lang="en-US" altLang="en-US" sz="1100" b="1" i="0" u="none" strike="noStrike" cap="none" normalizeH="0" baseline="0" dirty="0">
+                <a:ln>
+                  <a:noFill/>
+                </a:ln>
+                <a:solidFill>
+                  <a:srgbClr val="CC7832"/>
+                </a:solidFill>
+                <a:effectLst/>
+                <a:latin typeface="JetBrains Mono"/>
+              </a:rPr>
+            </a:br>
+            <a:r>
+              <a:rPr kumimoji="0" lang="en-US" altLang="en-US" sz="1100" b="1" i="0" u="none" strike="noStrike" cap="none" normalizeH="0" baseline="0" dirty="0">
+                <a:ln>
+                  <a:noFill/>
+                </a:ln>
+                <a:solidFill>
+                  <a:srgbClr val="CC7832"/>
+                </a:solidFill>
+                <a:effectLst/>
+                <a:latin typeface="JetBrains Mono"/>
+              </a:rPr>
+              <a:t>    </a:t>
+            </a:r>
+            <a:r>
+              <a:rPr kumimoji="0" lang="en-US" altLang="en-US" sz="1100" b="1" i="1" u="none" strike="noStrike" cap="none" normalizeH="0" baseline="0" dirty="0">
+                <a:ln>
+                  <a:noFill/>
+                </a:ln>
+                <a:solidFill>
+                  <a:srgbClr val="629755"/>
+                </a:solidFill>
+                <a:effectLst/>
+                <a:latin typeface="JetBrains Mono"/>
+              </a:rPr>
+              <a:t>/***2nd way**/</a:t>
+            </a:r>
+            <a:br>
+              <a:rPr kumimoji="0" lang="en-US" altLang="en-US" sz="1100" b="1" i="1" u="none" strike="noStrike" cap="none" normalizeH="0" baseline="0" dirty="0">
+                <a:ln>
+                  <a:noFill/>
+                </a:ln>
+                <a:solidFill>
+                  <a:srgbClr val="629755"/>
+                </a:solidFill>
+                <a:effectLst/>
+                <a:latin typeface="JetBrains Mono"/>
+              </a:rPr>
+            </a:br>
+            <a:r>
+              <a:rPr kumimoji="0" lang="en-US" altLang="en-US" sz="1100" b="1" i="1" u="none" strike="noStrike" cap="none" normalizeH="0" baseline="0" dirty="0">
+                <a:ln>
+                  <a:noFill/>
+                </a:ln>
+                <a:solidFill>
+                  <a:srgbClr val="629755"/>
+                </a:solidFill>
+                <a:effectLst/>
+                <a:latin typeface="JetBrains Mono"/>
+              </a:rPr>
+              <a:t>     </a:t>
+            </a:r>
+            <a:r>
+              <a:rPr kumimoji="0" lang="en-US" altLang="en-US" sz="1100" b="1" i="0" u="none" strike="noStrike" cap="none" normalizeH="0" baseline="0" dirty="0">
+                <a:ln>
+                  <a:noFill/>
+                </a:ln>
+                <a:solidFill>
+                  <a:srgbClr val="A9B7C6"/>
+                </a:solidFill>
+                <a:effectLst/>
+                <a:latin typeface="JetBrains Mono"/>
+              </a:rPr>
+              <a:t>String </a:t>
+            </a:r>
+            <a:r>
+              <a:rPr kumimoji="0" lang="en-US" altLang="en-US" sz="1100" b="1" i="0" u="none" strike="noStrike" cap="none" normalizeH="0" baseline="0" dirty="0" err="1">
+                <a:ln>
+                  <a:noFill/>
+                </a:ln>
+                <a:solidFill>
+                  <a:srgbClr val="A9B7C6"/>
+                </a:solidFill>
+                <a:effectLst/>
+                <a:latin typeface="JetBrains Mono"/>
+              </a:rPr>
+              <a:t>selectionArgs</a:t>
+            </a:r>
+            <a:r>
+              <a:rPr kumimoji="0" lang="en-US" altLang="en-US" sz="1100" b="1" i="0" u="none" strike="noStrike" cap="none" normalizeH="0" baseline="0" dirty="0">
+                <a:ln>
+                  <a:noFill/>
+                </a:ln>
+                <a:solidFill>
+                  <a:srgbClr val="A9B7C6"/>
+                </a:solidFill>
+                <a:effectLst/>
+                <a:latin typeface="JetBrains Mono"/>
+              </a:rPr>
+              <a:t>[]={name}</a:t>
+            </a:r>
+            <a:r>
+              <a:rPr kumimoji="0" lang="en-US" altLang="en-US" sz="1100" b="1" i="0" u="none" strike="noStrike" cap="none" normalizeH="0" baseline="0" dirty="0">
+                <a:ln>
+                  <a:noFill/>
+                </a:ln>
+                <a:solidFill>
+                  <a:srgbClr val="CC7832"/>
+                </a:solidFill>
+                <a:effectLst/>
+                <a:latin typeface="JetBrains Mono"/>
+              </a:rPr>
+              <a:t>;</a:t>
+            </a:r>
+            <a:br>
+              <a:rPr kumimoji="0" lang="en-US" altLang="en-US" sz="1100" b="1" i="0" u="none" strike="noStrike" cap="none" normalizeH="0" baseline="0" dirty="0">
+                <a:ln>
+                  <a:noFill/>
+                </a:ln>
+                <a:solidFill>
+                  <a:srgbClr val="CC7832"/>
+                </a:solidFill>
+                <a:effectLst/>
+                <a:latin typeface="JetBrains Mono"/>
+              </a:rPr>
+            </a:br>
+            <a:r>
+              <a:rPr kumimoji="0" lang="en-US" altLang="en-US" sz="1100" b="1" i="0" u="none" strike="noStrike" cap="none" normalizeH="0" baseline="0" dirty="0">
+                <a:ln>
+                  <a:noFill/>
+                </a:ln>
+                <a:solidFill>
+                  <a:srgbClr val="CC7832"/>
+                </a:solidFill>
+                <a:effectLst/>
+                <a:latin typeface="JetBrains Mono"/>
+              </a:rPr>
+              <a:t>     </a:t>
+            </a:r>
+            <a:r>
+              <a:rPr kumimoji="0" lang="en-US" altLang="en-US" sz="1100" b="1" i="0" u="none" strike="noStrike" cap="none" normalizeH="0" baseline="0" dirty="0">
+                <a:ln>
+                  <a:noFill/>
+                </a:ln>
+                <a:solidFill>
+                  <a:srgbClr val="A9B7C6"/>
+                </a:solidFill>
+                <a:effectLst/>
+                <a:latin typeface="JetBrains Mono"/>
+              </a:rPr>
+              <a:t>String </a:t>
+            </a:r>
+            <a:r>
+              <a:rPr kumimoji="0" lang="en-US" altLang="en-US" sz="1100" b="1" i="0" u="none" strike="noStrike" cap="none" normalizeH="0" baseline="0" dirty="0" err="1">
+                <a:ln>
+                  <a:noFill/>
+                </a:ln>
+                <a:solidFill>
+                  <a:srgbClr val="A9B7C6"/>
+                </a:solidFill>
+                <a:effectLst/>
+                <a:latin typeface="JetBrains Mono"/>
+              </a:rPr>
+              <a:t>whereCondition</a:t>
+            </a:r>
+            <a:r>
+              <a:rPr kumimoji="0" lang="en-US" altLang="en-US" sz="1100" b="1" i="0" u="none" strike="noStrike" cap="none" normalizeH="0" baseline="0" dirty="0">
+                <a:ln>
+                  <a:noFill/>
+                </a:ln>
+                <a:solidFill>
+                  <a:srgbClr val="A9B7C6"/>
+                </a:solidFill>
+                <a:effectLst/>
+                <a:latin typeface="JetBrains Mono"/>
+              </a:rPr>
+              <a:t>=columns[</a:t>
+            </a:r>
+            <a:r>
+              <a:rPr kumimoji="0" lang="en-US" altLang="en-US" sz="1100" b="1" i="0" u="none" strike="noStrike" cap="none" normalizeH="0" baseline="0" dirty="0">
+                <a:ln>
+                  <a:noFill/>
+                </a:ln>
+                <a:solidFill>
+                  <a:srgbClr val="6897BB"/>
+                </a:solidFill>
+                <a:effectLst/>
+                <a:latin typeface="JetBrains Mono"/>
+              </a:rPr>
+              <a:t>0</a:t>
+            </a:r>
+            <a:r>
+              <a:rPr kumimoji="0" lang="en-US" altLang="en-US" sz="1100" b="1" i="0" u="none" strike="noStrike" cap="none" normalizeH="0" baseline="0" dirty="0">
+                <a:ln>
+                  <a:noFill/>
+                </a:ln>
+                <a:solidFill>
+                  <a:srgbClr val="A9B7C6"/>
+                </a:solidFill>
+                <a:effectLst/>
+                <a:latin typeface="JetBrains Mono"/>
+              </a:rPr>
+              <a:t>]+</a:t>
+            </a:r>
+            <a:r>
+              <a:rPr kumimoji="0" lang="en-US" altLang="en-US" sz="1100" b="1" i="0" u="none" strike="noStrike" cap="none" normalizeH="0" baseline="0" dirty="0">
+                <a:ln>
+                  <a:noFill/>
+                </a:ln>
+                <a:solidFill>
+                  <a:srgbClr val="6A8759"/>
+                </a:solidFill>
+                <a:effectLst/>
+                <a:latin typeface="JetBrains Mono"/>
+              </a:rPr>
+              <a:t>"=?"</a:t>
+            </a:r>
+            <a:r>
+              <a:rPr kumimoji="0" lang="en-US" altLang="en-US" sz="1100" b="1" i="0" u="none" strike="noStrike" cap="none" normalizeH="0" baseline="0" dirty="0">
+                <a:ln>
+                  <a:noFill/>
+                </a:ln>
+                <a:solidFill>
+                  <a:srgbClr val="CC7832"/>
+                </a:solidFill>
+                <a:effectLst/>
+                <a:latin typeface="JetBrains Mono"/>
+              </a:rPr>
+              <a:t>;</a:t>
+            </a:r>
+            <a:br>
+              <a:rPr kumimoji="0" lang="en-US" altLang="en-US" sz="1100" b="1" i="0" u="none" strike="noStrike" cap="none" normalizeH="0" baseline="0" dirty="0">
+                <a:ln>
+                  <a:noFill/>
+                </a:ln>
+                <a:solidFill>
+                  <a:srgbClr val="CC7832"/>
+                </a:solidFill>
+                <a:effectLst/>
+                <a:latin typeface="JetBrains Mono"/>
+              </a:rPr>
+            </a:br>
+            <a:r>
+              <a:rPr kumimoji="0" lang="en-US" altLang="en-US" sz="1100" b="1" i="0" u="none" strike="noStrike" cap="none" normalizeH="0" baseline="0" dirty="0">
+                <a:ln>
+                  <a:noFill/>
+                </a:ln>
+                <a:solidFill>
+                  <a:srgbClr val="CC7832"/>
+                </a:solidFill>
+                <a:effectLst/>
+                <a:latin typeface="JetBrains Mono"/>
+              </a:rPr>
+              <a:t>     </a:t>
+            </a:r>
+            <a:r>
+              <a:rPr kumimoji="0" lang="en-US" altLang="en-US" sz="1100" b="1" i="0" u="none" strike="noStrike" cap="none" normalizeH="0" baseline="0" dirty="0">
+                <a:ln>
+                  <a:noFill/>
+                </a:ln>
+                <a:solidFill>
+                  <a:srgbClr val="A9B7C6"/>
+                </a:solidFill>
+                <a:effectLst/>
+                <a:latin typeface="JetBrains Mono"/>
+              </a:rPr>
+              <a:t>Cursor cursor=</a:t>
+            </a:r>
+            <a:r>
+              <a:rPr kumimoji="0" lang="en-US" altLang="en-US" sz="1100" b="1" i="0" u="none" strike="noStrike" cap="none" normalizeH="0" baseline="0" dirty="0" err="1">
+                <a:ln>
+                  <a:noFill/>
+                </a:ln>
+                <a:solidFill>
+                  <a:srgbClr val="A9B7C6"/>
+                </a:solidFill>
+                <a:effectLst/>
+                <a:latin typeface="JetBrains Mono"/>
+              </a:rPr>
+              <a:t>db.query</a:t>
+            </a:r>
+            <a:r>
+              <a:rPr kumimoji="0" lang="en-US" altLang="en-US" sz="1100" b="1" i="0" u="none" strike="noStrike" cap="none" normalizeH="0" baseline="0" dirty="0">
+                <a:ln>
+                  <a:noFill/>
+                </a:ln>
+                <a:solidFill>
+                  <a:srgbClr val="A9B7C6"/>
+                </a:solidFill>
+                <a:effectLst/>
+                <a:latin typeface="JetBrains Mono"/>
+              </a:rPr>
+              <a:t>(</a:t>
+            </a:r>
+            <a:r>
+              <a:rPr kumimoji="0" lang="en-US" altLang="en-US" sz="1100" b="1" i="0" u="none" strike="noStrike" cap="none" normalizeH="0" baseline="0" dirty="0">
+                <a:ln>
+                  <a:noFill/>
+                </a:ln>
+                <a:solidFill>
+                  <a:srgbClr val="9876AA"/>
+                </a:solidFill>
+                <a:effectLst/>
+                <a:latin typeface="JetBrains Mono"/>
+              </a:rPr>
+              <a:t>sqLiteHelper</a:t>
+            </a:r>
+            <a:r>
+              <a:rPr kumimoji="0" lang="en-US" altLang="en-US" sz="1100" b="1" i="0" u="none" strike="noStrike" cap="none" normalizeH="0" baseline="0" dirty="0">
+                <a:ln>
+                  <a:noFill/>
+                </a:ln>
+                <a:solidFill>
+                  <a:srgbClr val="A9B7C6"/>
+                </a:solidFill>
+                <a:effectLst/>
+                <a:latin typeface="JetBrains Mono"/>
+              </a:rPr>
+              <a:t>.</a:t>
+            </a:r>
+            <a:r>
+              <a:rPr kumimoji="0" lang="en-US" altLang="en-US" sz="1100" b="1" i="1" u="none" strike="noStrike" cap="none" normalizeH="0" baseline="0" dirty="0">
+                <a:ln>
+                  <a:noFill/>
+                </a:ln>
+                <a:solidFill>
+                  <a:srgbClr val="9876AA"/>
+                </a:solidFill>
+                <a:effectLst/>
+                <a:latin typeface="JetBrains Mono"/>
+              </a:rPr>
+              <a:t>TABLE_NAME</a:t>
+            </a:r>
+            <a:r>
+              <a:rPr kumimoji="0" lang="en-US" altLang="en-US" sz="1100" b="1" i="0" u="none" strike="noStrike" cap="none" normalizeH="0" baseline="0" dirty="0">
+                <a:ln>
+                  <a:noFill/>
+                </a:ln>
+                <a:solidFill>
+                  <a:srgbClr val="CC7832"/>
+                </a:solidFill>
+                <a:effectLst/>
+                <a:latin typeface="JetBrains Mono"/>
+              </a:rPr>
+              <a:t>,</a:t>
+            </a:r>
+            <a:r>
+              <a:rPr kumimoji="0" lang="en-US" altLang="en-US" sz="1100" b="1" i="0" u="none" strike="noStrike" cap="none" normalizeH="0" baseline="0" dirty="0">
+                <a:ln>
+                  <a:noFill/>
+                </a:ln>
+                <a:solidFill>
+                  <a:srgbClr val="A9B7C6"/>
+                </a:solidFill>
+                <a:effectLst/>
+                <a:latin typeface="JetBrains Mono"/>
+              </a:rPr>
+              <a:t>columns</a:t>
+            </a:r>
+            <a:r>
+              <a:rPr kumimoji="0" lang="en-US" altLang="en-US" sz="1100" b="1" i="0" u="none" strike="noStrike" cap="none" normalizeH="0" baseline="0" dirty="0">
+                <a:ln>
+                  <a:noFill/>
+                </a:ln>
+                <a:solidFill>
+                  <a:srgbClr val="CC7832"/>
+                </a:solidFill>
+                <a:effectLst/>
+                <a:latin typeface="JetBrains Mono"/>
+              </a:rPr>
+              <a:t>,</a:t>
+            </a:r>
+            <a:r>
+              <a:rPr kumimoji="0" lang="en-US" altLang="en-US" sz="1100" b="1" i="0" u="none" strike="noStrike" cap="none" normalizeH="0" baseline="0" dirty="0">
+                <a:ln>
+                  <a:noFill/>
+                </a:ln>
+                <a:solidFill>
+                  <a:srgbClr val="A9B7C6"/>
+                </a:solidFill>
+                <a:effectLst/>
+                <a:latin typeface="JetBrains Mono"/>
+              </a:rPr>
+              <a:t>whereCondition</a:t>
+            </a:r>
+            <a:r>
+              <a:rPr kumimoji="0" lang="en-US" altLang="en-US" sz="1100" b="1" i="0" u="none" strike="noStrike" cap="none" normalizeH="0" baseline="0" dirty="0">
+                <a:ln>
+                  <a:noFill/>
+                </a:ln>
+                <a:solidFill>
+                  <a:srgbClr val="CC7832"/>
+                </a:solidFill>
+                <a:effectLst/>
+                <a:latin typeface="JetBrains Mono"/>
+              </a:rPr>
+              <a:t>,</a:t>
+            </a:r>
+            <a:r>
+              <a:rPr kumimoji="0" lang="en-US" altLang="en-US" sz="1100" b="1" i="0" u="none" strike="noStrike" cap="none" normalizeH="0" baseline="0" dirty="0">
+                <a:ln>
+                  <a:noFill/>
+                </a:ln>
+                <a:solidFill>
+                  <a:srgbClr val="A9B7C6"/>
+                </a:solidFill>
+                <a:effectLst/>
+                <a:latin typeface="JetBrains Mono"/>
+              </a:rPr>
+              <a:t>selectionArgs</a:t>
+            </a:r>
+            <a:r>
+              <a:rPr kumimoji="0" lang="en-US" altLang="en-US" sz="1100" b="1" i="0" u="none" strike="noStrike" cap="none" normalizeH="0" baseline="0" dirty="0">
+                <a:ln>
+                  <a:noFill/>
+                </a:ln>
+                <a:solidFill>
+                  <a:srgbClr val="CC7832"/>
+                </a:solidFill>
+                <a:effectLst/>
+                <a:latin typeface="JetBrains Mono"/>
+              </a:rPr>
+              <a:t>,null,null,null</a:t>
+            </a:r>
+            <a:r>
+              <a:rPr kumimoji="0" lang="en-US" altLang="en-US" sz="1100" b="1" i="0" u="none" strike="noStrike" cap="none" normalizeH="0" baseline="0" dirty="0">
+                <a:ln>
+                  <a:noFill/>
+                </a:ln>
+                <a:solidFill>
+                  <a:srgbClr val="A9B7C6"/>
+                </a:solidFill>
+                <a:effectLst/>
+                <a:latin typeface="JetBrains Mono"/>
+              </a:rPr>
+              <a:t>)</a:t>
+            </a:r>
+            <a:r>
+              <a:rPr kumimoji="0" lang="en-US" altLang="en-US" sz="1100" b="1" i="0" u="none" strike="noStrike" cap="none" normalizeH="0" baseline="0" dirty="0">
+                <a:ln>
+                  <a:noFill/>
+                </a:ln>
+                <a:solidFill>
+                  <a:srgbClr val="CC7832"/>
+                </a:solidFill>
+                <a:effectLst/>
+                <a:latin typeface="JetBrains Mono"/>
+              </a:rPr>
+              <a:t>;</a:t>
+            </a:r>
+            <a:br>
+              <a:rPr kumimoji="0" lang="en-US" altLang="en-US" sz="1100" b="1" i="0" u="none" strike="noStrike" cap="none" normalizeH="0" baseline="0" dirty="0">
+                <a:ln>
+                  <a:noFill/>
+                </a:ln>
+                <a:solidFill>
+                  <a:srgbClr val="CC7832"/>
+                </a:solidFill>
+                <a:effectLst/>
+                <a:latin typeface="JetBrains Mono"/>
+              </a:rPr>
+            </a:br>
+            <a:r>
+              <a:rPr kumimoji="0" lang="en-US" altLang="en-US" sz="1100" b="1" i="0" u="none" strike="noStrike" cap="none" normalizeH="0" baseline="0" dirty="0">
+                <a:ln>
+                  <a:noFill/>
+                </a:ln>
+                <a:solidFill>
+                  <a:srgbClr val="CC7832"/>
+                </a:solidFill>
+                <a:effectLst/>
+                <a:latin typeface="JetBrains Mono"/>
+              </a:rPr>
+              <a:t>    </a:t>
+            </a:r>
+            <a:r>
+              <a:rPr kumimoji="0" lang="en-US" altLang="en-US" sz="1100" b="1" i="0" u="none" strike="noStrike" cap="none" normalizeH="0" baseline="0" dirty="0" err="1">
+                <a:ln>
+                  <a:noFill/>
+                </a:ln>
+                <a:solidFill>
+                  <a:srgbClr val="A9B7C6"/>
+                </a:solidFill>
+                <a:effectLst/>
+                <a:latin typeface="JetBrains Mono"/>
+              </a:rPr>
+              <a:t>StringBuffer</a:t>
+            </a:r>
+            <a:r>
+              <a:rPr kumimoji="0" lang="en-US" altLang="en-US" sz="1100" b="1" i="0" u="none" strike="noStrike" cap="none" normalizeH="0" baseline="0" dirty="0">
+                <a:ln>
+                  <a:noFill/>
+                </a:ln>
+                <a:solidFill>
+                  <a:srgbClr val="A9B7C6"/>
+                </a:solidFill>
+                <a:effectLst/>
+                <a:latin typeface="JetBrains Mono"/>
+              </a:rPr>
+              <a:t> </a:t>
+            </a:r>
+            <a:r>
+              <a:rPr kumimoji="0" lang="en-US" altLang="en-US" sz="1100" b="1" i="0" u="none" strike="noStrike" cap="none" normalizeH="0" baseline="0" dirty="0" err="1">
+                <a:ln>
+                  <a:noFill/>
+                </a:ln>
+                <a:solidFill>
+                  <a:srgbClr val="A9B7C6"/>
+                </a:solidFill>
+                <a:effectLst/>
+                <a:latin typeface="JetBrains Mono"/>
+              </a:rPr>
+              <a:t>stringBuffer</a:t>
+            </a:r>
+            <a:r>
+              <a:rPr kumimoji="0" lang="en-US" altLang="en-US" sz="1100" b="1" i="0" u="none" strike="noStrike" cap="none" normalizeH="0" baseline="0" dirty="0">
+                <a:ln>
+                  <a:noFill/>
+                </a:ln>
+                <a:solidFill>
+                  <a:srgbClr val="A9B7C6"/>
+                </a:solidFill>
+                <a:effectLst/>
+                <a:latin typeface="JetBrains Mono"/>
+              </a:rPr>
+              <a:t>=</a:t>
+            </a:r>
+            <a:r>
+              <a:rPr kumimoji="0" lang="en-US" altLang="en-US" sz="1100" b="1" i="0" u="none" strike="noStrike" cap="none" normalizeH="0" baseline="0" dirty="0">
+                <a:ln>
+                  <a:noFill/>
+                </a:ln>
+                <a:solidFill>
+                  <a:srgbClr val="CC7832"/>
+                </a:solidFill>
+                <a:effectLst/>
+                <a:latin typeface="JetBrains Mono"/>
+              </a:rPr>
+              <a:t>new </a:t>
+            </a:r>
+            <a:r>
+              <a:rPr kumimoji="0" lang="en-US" altLang="en-US" sz="1100" b="1" i="0" u="none" strike="noStrike" cap="none" normalizeH="0" baseline="0" dirty="0" err="1">
+                <a:ln>
+                  <a:noFill/>
+                </a:ln>
+                <a:solidFill>
+                  <a:srgbClr val="A9B7C6"/>
+                </a:solidFill>
+                <a:effectLst/>
+                <a:latin typeface="JetBrains Mono"/>
+              </a:rPr>
+              <a:t>StringBuffer</a:t>
+            </a:r>
+            <a:r>
+              <a:rPr kumimoji="0" lang="en-US" altLang="en-US" sz="1100" b="1" i="0" u="none" strike="noStrike" cap="none" normalizeH="0" baseline="0" dirty="0">
+                <a:ln>
+                  <a:noFill/>
+                </a:ln>
+                <a:solidFill>
+                  <a:srgbClr val="A9B7C6"/>
+                </a:solidFill>
+                <a:effectLst/>
+                <a:latin typeface="JetBrains Mono"/>
+              </a:rPr>
+              <a:t>()</a:t>
+            </a:r>
+            <a:r>
+              <a:rPr kumimoji="0" lang="en-US" altLang="en-US" sz="1100" b="1" i="0" u="none" strike="noStrike" cap="none" normalizeH="0" baseline="0" dirty="0">
+                <a:ln>
+                  <a:noFill/>
+                </a:ln>
+                <a:solidFill>
+                  <a:srgbClr val="CC7832"/>
+                </a:solidFill>
+                <a:effectLst/>
+                <a:latin typeface="JetBrains Mono"/>
+              </a:rPr>
+              <a:t>;</a:t>
+            </a:r>
+            <a:br>
+              <a:rPr kumimoji="0" lang="en-US" altLang="en-US" sz="1100" b="1" i="0" u="none" strike="noStrike" cap="none" normalizeH="0" baseline="0" dirty="0">
+                <a:ln>
+                  <a:noFill/>
+                </a:ln>
+                <a:solidFill>
+                  <a:srgbClr val="CC7832"/>
+                </a:solidFill>
+                <a:effectLst/>
+                <a:latin typeface="JetBrains Mono"/>
+              </a:rPr>
+            </a:br>
+            <a:r>
+              <a:rPr kumimoji="0" lang="en-US" altLang="en-US" sz="1100" b="1" i="0" u="none" strike="noStrike" cap="none" normalizeH="0" baseline="0" dirty="0">
+                <a:ln>
+                  <a:noFill/>
+                </a:ln>
+                <a:solidFill>
+                  <a:srgbClr val="CC7832"/>
+                </a:solidFill>
+                <a:effectLst/>
+                <a:latin typeface="JetBrains Mono"/>
+              </a:rPr>
+              <a:t>    int </a:t>
+            </a:r>
+            <a:r>
+              <a:rPr kumimoji="0" lang="en-US" altLang="en-US" sz="1100" b="1" i="0" u="none" strike="noStrike" cap="none" normalizeH="0" baseline="0" dirty="0">
+                <a:ln>
+                  <a:noFill/>
+                </a:ln>
+                <a:solidFill>
+                  <a:srgbClr val="A9B7C6"/>
+                </a:solidFill>
+                <a:effectLst/>
+                <a:latin typeface="JetBrains Mono"/>
+              </a:rPr>
+              <a:t>index</a:t>
+            </a:r>
+            <a:r>
+              <a:rPr kumimoji="0" lang="en-US" altLang="en-US" sz="1100" b="1" i="0" u="none" strike="noStrike" cap="none" normalizeH="0" baseline="0" dirty="0">
+                <a:ln>
+                  <a:noFill/>
+                </a:ln>
+                <a:solidFill>
+                  <a:srgbClr val="CC7832"/>
+                </a:solidFill>
+                <a:effectLst/>
+                <a:latin typeface="JetBrains Mono"/>
+              </a:rPr>
+              <a:t>;</a:t>
+            </a:r>
+            <a:br>
+              <a:rPr kumimoji="0" lang="en-US" altLang="en-US" sz="1100" b="1" i="0" u="none" strike="noStrike" cap="none" normalizeH="0" baseline="0" dirty="0">
+                <a:ln>
+                  <a:noFill/>
+                </a:ln>
+                <a:solidFill>
+                  <a:srgbClr val="CC7832"/>
+                </a:solidFill>
+                <a:effectLst/>
+                <a:latin typeface="JetBrains Mono"/>
+              </a:rPr>
+            </a:br>
+            <a:r>
+              <a:rPr kumimoji="0" lang="en-US" altLang="en-US" sz="1100" b="1" i="0" u="none" strike="noStrike" cap="none" normalizeH="0" baseline="0" dirty="0">
+                <a:ln>
+                  <a:noFill/>
+                </a:ln>
+                <a:solidFill>
+                  <a:srgbClr val="CC7832"/>
+                </a:solidFill>
+                <a:effectLst/>
+                <a:latin typeface="JetBrains Mono"/>
+              </a:rPr>
+              <a:t>    if</a:t>
+            </a:r>
+            <a:r>
+              <a:rPr kumimoji="0" lang="en-US" altLang="en-US" sz="1100" b="1" i="0" u="none" strike="noStrike" cap="none" normalizeH="0" baseline="0" dirty="0">
+                <a:ln>
+                  <a:noFill/>
+                </a:ln>
+                <a:solidFill>
+                  <a:srgbClr val="A9B7C6"/>
+                </a:solidFill>
+                <a:effectLst/>
+                <a:latin typeface="JetBrains Mono"/>
+              </a:rPr>
+              <a:t>(cursor!=</a:t>
+            </a:r>
+            <a:r>
+              <a:rPr kumimoji="0" lang="en-US" altLang="en-US" sz="1100" b="1" i="0" u="none" strike="noStrike" cap="none" normalizeH="0" baseline="0" dirty="0">
+                <a:ln>
+                  <a:noFill/>
+                </a:ln>
+                <a:solidFill>
+                  <a:srgbClr val="CC7832"/>
+                </a:solidFill>
+                <a:effectLst/>
+                <a:latin typeface="JetBrains Mono"/>
+              </a:rPr>
+              <a:t>null</a:t>
+            </a:r>
+            <a:r>
+              <a:rPr kumimoji="0" lang="en-US" altLang="en-US" sz="1100" b="1" i="0" u="none" strike="noStrike" cap="none" normalizeH="0" baseline="0" dirty="0">
+                <a:ln>
+                  <a:noFill/>
+                </a:ln>
+                <a:solidFill>
+                  <a:srgbClr val="A9B7C6"/>
+                </a:solidFill>
+                <a:effectLst/>
+                <a:latin typeface="JetBrains Mono"/>
+              </a:rPr>
+              <a:t>) {</a:t>
+            </a:r>
+            <a:br>
+              <a:rPr kumimoji="0" lang="en-US" altLang="en-US" sz="1100" b="1" i="0" u="none" strike="noStrike" cap="none" normalizeH="0" baseline="0" dirty="0">
+                <a:ln>
+                  <a:noFill/>
+                </a:ln>
+                <a:solidFill>
+                  <a:srgbClr val="A9B7C6"/>
+                </a:solidFill>
+                <a:effectLst/>
+                <a:latin typeface="JetBrains Mono"/>
+              </a:rPr>
+            </a:br>
+            <a:r>
+              <a:rPr kumimoji="0" lang="en-US" altLang="en-US" sz="1100" b="1" i="0" u="none" strike="noStrike" cap="none" normalizeH="0" baseline="0" dirty="0">
+                <a:ln>
+                  <a:noFill/>
+                </a:ln>
+                <a:solidFill>
+                  <a:srgbClr val="A9B7C6"/>
+                </a:solidFill>
+                <a:effectLst/>
+                <a:latin typeface="JetBrains Mono"/>
+              </a:rPr>
+              <a:t>        </a:t>
+            </a:r>
+            <a:r>
+              <a:rPr kumimoji="0" lang="en-US" altLang="en-US" sz="1100" b="1" i="0" u="none" strike="noStrike" cap="none" normalizeH="0" baseline="0" dirty="0">
+                <a:ln>
+                  <a:noFill/>
+                </a:ln>
+                <a:solidFill>
+                  <a:srgbClr val="CC7832"/>
+                </a:solidFill>
+                <a:effectLst/>
+                <a:latin typeface="JetBrains Mono"/>
+              </a:rPr>
+              <a:t>while </a:t>
+            </a:r>
+            <a:r>
+              <a:rPr kumimoji="0" lang="en-US" altLang="en-US" sz="1100" b="1" i="0" u="none" strike="noStrike" cap="none" normalizeH="0" baseline="0" dirty="0">
+                <a:ln>
+                  <a:noFill/>
+                </a:ln>
+                <a:solidFill>
+                  <a:srgbClr val="A9B7C6"/>
+                </a:solidFill>
+                <a:effectLst/>
+                <a:latin typeface="JetBrains Mono"/>
+              </a:rPr>
+              <a:t>(</a:t>
+            </a:r>
+            <a:r>
+              <a:rPr kumimoji="0" lang="en-US" altLang="en-US" sz="1100" b="1" i="0" u="none" strike="noStrike" cap="none" normalizeH="0" baseline="0" dirty="0" err="1">
+                <a:ln>
+                  <a:noFill/>
+                </a:ln>
+                <a:solidFill>
+                  <a:srgbClr val="A9B7C6"/>
+                </a:solidFill>
+                <a:effectLst/>
+                <a:latin typeface="JetBrains Mono"/>
+              </a:rPr>
+              <a:t>cursor.moveToNext</a:t>
+            </a:r>
+            <a:r>
+              <a:rPr kumimoji="0" lang="en-US" altLang="en-US" sz="1100" b="1" i="0" u="none" strike="noStrike" cap="none" normalizeH="0" baseline="0" dirty="0">
+                <a:ln>
+                  <a:noFill/>
+                </a:ln>
+                <a:solidFill>
+                  <a:srgbClr val="A9B7C6"/>
+                </a:solidFill>
+                <a:effectLst/>
+                <a:latin typeface="JetBrains Mono"/>
+              </a:rPr>
+              <a:t>()) {</a:t>
+            </a:r>
+            <a:br>
+              <a:rPr kumimoji="0" lang="en-US" altLang="en-US" sz="1100" b="1" i="0" u="none" strike="noStrike" cap="none" normalizeH="0" baseline="0" dirty="0">
+                <a:ln>
+                  <a:noFill/>
+                </a:ln>
+                <a:solidFill>
+                  <a:srgbClr val="A9B7C6"/>
+                </a:solidFill>
+                <a:effectLst/>
+                <a:latin typeface="JetBrains Mono"/>
+              </a:rPr>
+            </a:br>
+            <a:br>
+              <a:rPr kumimoji="0" lang="en-US" altLang="en-US" sz="1100" b="1" i="1" u="none" strike="noStrike" cap="none" normalizeH="0" baseline="0" dirty="0">
+                <a:ln>
+                  <a:noFill/>
+                </a:ln>
+                <a:solidFill>
+                  <a:srgbClr val="629755"/>
+                </a:solidFill>
+                <a:effectLst/>
+                <a:latin typeface="JetBrains Mono"/>
+              </a:rPr>
+            </a:br>
+            <a:r>
+              <a:rPr kumimoji="0" lang="en-US" altLang="en-US" sz="1100" b="1" i="1" u="none" strike="noStrike" cap="none" normalizeH="0" baseline="0" dirty="0">
+                <a:ln>
+                  <a:noFill/>
+                </a:ln>
+                <a:solidFill>
+                  <a:srgbClr val="629755"/>
+                </a:solidFill>
+                <a:effectLst/>
+                <a:latin typeface="JetBrains Mono"/>
+              </a:rPr>
+              <a:t>            </a:t>
+            </a:r>
+            <a:r>
+              <a:rPr kumimoji="0" lang="en-US" altLang="en-US" sz="1100" b="1" i="0" u="none" strike="noStrike" cap="none" normalizeH="0" baseline="0" dirty="0">
+                <a:ln>
+                  <a:noFill/>
+                </a:ln>
+                <a:solidFill>
+                  <a:srgbClr val="CC7832"/>
+                </a:solidFill>
+                <a:effectLst/>
+                <a:latin typeface="JetBrains Mono"/>
+              </a:rPr>
+              <a:t>for </a:t>
+            </a:r>
+            <a:r>
+              <a:rPr kumimoji="0" lang="en-US" altLang="en-US" sz="1100" b="1" i="0" u="none" strike="noStrike" cap="none" normalizeH="0" baseline="0" dirty="0">
+                <a:ln>
+                  <a:noFill/>
+                </a:ln>
+                <a:solidFill>
+                  <a:srgbClr val="A9B7C6"/>
+                </a:solidFill>
+                <a:effectLst/>
+                <a:latin typeface="JetBrains Mono"/>
+              </a:rPr>
+              <a:t>(</a:t>
+            </a:r>
+            <a:r>
+              <a:rPr kumimoji="0" lang="en-US" altLang="en-US" sz="1100" b="1" i="0" u="none" strike="noStrike" cap="none" normalizeH="0" baseline="0" dirty="0">
+                <a:ln>
+                  <a:noFill/>
+                </a:ln>
+                <a:solidFill>
+                  <a:srgbClr val="CC7832"/>
+                </a:solidFill>
+                <a:effectLst/>
+                <a:latin typeface="JetBrains Mono"/>
+              </a:rPr>
+              <a:t>int </a:t>
+            </a:r>
+            <a:r>
+              <a:rPr kumimoji="0" lang="en-US" altLang="en-US" sz="1100" b="1" i="0" u="none" strike="noStrike" cap="none" normalizeH="0" baseline="0" dirty="0" err="1">
+                <a:ln>
+                  <a:noFill/>
+                </a:ln>
+                <a:solidFill>
+                  <a:srgbClr val="A9B7C6"/>
+                </a:solidFill>
+                <a:effectLst/>
+                <a:latin typeface="JetBrains Mono"/>
+              </a:rPr>
+              <a:t>i</a:t>
+            </a:r>
+            <a:r>
+              <a:rPr kumimoji="0" lang="en-US" altLang="en-US" sz="1100" b="1" i="0" u="none" strike="noStrike" cap="none" normalizeH="0" baseline="0" dirty="0">
+                <a:ln>
+                  <a:noFill/>
+                </a:ln>
+                <a:solidFill>
+                  <a:srgbClr val="A9B7C6"/>
+                </a:solidFill>
+                <a:effectLst/>
+                <a:latin typeface="JetBrains Mono"/>
+              </a:rPr>
+              <a:t> = </a:t>
+            </a:r>
+            <a:r>
+              <a:rPr kumimoji="0" lang="en-US" altLang="en-US" sz="1100" b="1" i="0" u="none" strike="noStrike" cap="none" normalizeH="0" baseline="0" dirty="0">
+                <a:ln>
+                  <a:noFill/>
+                </a:ln>
+                <a:solidFill>
+                  <a:srgbClr val="6897BB"/>
+                </a:solidFill>
+                <a:effectLst/>
+                <a:latin typeface="JetBrains Mono"/>
+              </a:rPr>
+              <a:t>0</a:t>
+            </a:r>
+            <a:r>
+              <a:rPr kumimoji="0" lang="en-US" altLang="en-US" sz="1100" b="1" i="0" u="none" strike="noStrike" cap="none" normalizeH="0" baseline="0" dirty="0">
+                <a:ln>
+                  <a:noFill/>
+                </a:ln>
+                <a:solidFill>
+                  <a:srgbClr val="CC7832"/>
+                </a:solidFill>
+                <a:effectLst/>
+                <a:latin typeface="JetBrains Mono"/>
+              </a:rPr>
+              <a:t>; </a:t>
+            </a:r>
+            <a:r>
+              <a:rPr kumimoji="0" lang="en-US" altLang="en-US" sz="1100" b="1" i="0" u="none" strike="noStrike" cap="none" normalizeH="0" baseline="0" dirty="0" err="1">
+                <a:ln>
+                  <a:noFill/>
+                </a:ln>
+                <a:solidFill>
+                  <a:srgbClr val="A9B7C6"/>
+                </a:solidFill>
+                <a:effectLst/>
+                <a:latin typeface="JetBrains Mono"/>
+              </a:rPr>
+              <a:t>i</a:t>
+            </a:r>
+            <a:r>
+              <a:rPr kumimoji="0" lang="en-US" altLang="en-US" sz="1100" b="1" i="0" u="none" strike="noStrike" cap="none" normalizeH="0" baseline="0" dirty="0">
+                <a:ln>
+                  <a:noFill/>
+                </a:ln>
+                <a:solidFill>
+                  <a:srgbClr val="A9B7C6"/>
+                </a:solidFill>
+                <a:effectLst/>
+                <a:latin typeface="JetBrains Mono"/>
+              </a:rPr>
+              <a:t> &lt; </a:t>
+            </a:r>
+            <a:r>
+              <a:rPr kumimoji="0" lang="en-US" altLang="en-US" sz="1100" b="1" i="0" u="none" strike="noStrike" cap="none" normalizeH="0" baseline="0" dirty="0" err="1">
+                <a:ln>
+                  <a:noFill/>
+                </a:ln>
+                <a:solidFill>
+                  <a:srgbClr val="A9B7C6"/>
+                </a:solidFill>
+                <a:effectLst/>
+                <a:latin typeface="JetBrains Mono"/>
+              </a:rPr>
+              <a:t>columns.</a:t>
+            </a:r>
+            <a:r>
+              <a:rPr kumimoji="0" lang="en-US" altLang="en-US" sz="1100" b="1" i="0" u="none" strike="noStrike" cap="none" normalizeH="0" baseline="0" dirty="0" err="1">
+                <a:ln>
+                  <a:noFill/>
+                </a:ln>
+                <a:solidFill>
+                  <a:srgbClr val="9876AA"/>
+                </a:solidFill>
+                <a:effectLst/>
+                <a:latin typeface="JetBrains Mono"/>
+              </a:rPr>
+              <a:t>length</a:t>
+            </a:r>
+            <a:r>
+              <a:rPr kumimoji="0" lang="en-US" altLang="en-US" sz="1100" b="1" i="0" u="none" strike="noStrike" cap="none" normalizeH="0" baseline="0" dirty="0">
+                <a:ln>
+                  <a:noFill/>
+                </a:ln>
+                <a:solidFill>
+                  <a:srgbClr val="CC7832"/>
+                </a:solidFill>
+                <a:effectLst/>
+                <a:latin typeface="JetBrains Mono"/>
+              </a:rPr>
+              <a:t>; </a:t>
+            </a:r>
+            <a:r>
+              <a:rPr kumimoji="0" lang="en-US" altLang="en-US" sz="1100" b="1" i="0" u="none" strike="noStrike" cap="none" normalizeH="0" baseline="0" dirty="0">
+                <a:ln>
+                  <a:noFill/>
+                </a:ln>
+                <a:solidFill>
+                  <a:srgbClr val="A9B7C6"/>
+                </a:solidFill>
+                <a:effectLst/>
+                <a:latin typeface="JetBrains Mono"/>
+              </a:rPr>
+              <a:t>++</a:t>
+            </a:r>
+            <a:r>
+              <a:rPr kumimoji="0" lang="en-US" altLang="en-US" sz="1100" b="1" i="0" u="none" strike="noStrike" cap="none" normalizeH="0" baseline="0" dirty="0" err="1">
+                <a:ln>
+                  <a:noFill/>
+                </a:ln>
+                <a:solidFill>
+                  <a:srgbClr val="A9B7C6"/>
+                </a:solidFill>
+                <a:effectLst/>
+                <a:latin typeface="JetBrains Mono"/>
+              </a:rPr>
+              <a:t>i</a:t>
+            </a:r>
+            <a:r>
+              <a:rPr kumimoji="0" lang="en-US" altLang="en-US" sz="1100" b="1" i="0" u="none" strike="noStrike" cap="none" normalizeH="0" baseline="0" dirty="0">
+                <a:ln>
+                  <a:noFill/>
+                </a:ln>
+                <a:solidFill>
+                  <a:srgbClr val="A9B7C6"/>
+                </a:solidFill>
+                <a:effectLst/>
+                <a:latin typeface="JetBrains Mono"/>
+              </a:rPr>
+              <a:t>) {</a:t>
+            </a:r>
+            <a:br>
+              <a:rPr kumimoji="0" lang="en-US" altLang="en-US" sz="1100" b="1" i="0" u="none" strike="noStrike" cap="none" normalizeH="0" baseline="0" dirty="0">
+                <a:ln>
+                  <a:noFill/>
+                </a:ln>
+                <a:solidFill>
+                  <a:srgbClr val="A9B7C6"/>
+                </a:solidFill>
+                <a:effectLst/>
+                <a:latin typeface="JetBrains Mono"/>
+              </a:rPr>
+            </a:br>
+            <a:r>
+              <a:rPr kumimoji="0" lang="en-US" altLang="en-US" sz="1100" b="1" i="0" u="none" strike="noStrike" cap="none" normalizeH="0" baseline="0" dirty="0">
+                <a:ln>
+                  <a:noFill/>
+                </a:ln>
+                <a:solidFill>
+                  <a:srgbClr val="A9B7C6"/>
+                </a:solidFill>
+                <a:effectLst/>
+                <a:latin typeface="JetBrains Mono"/>
+              </a:rPr>
+              <a:t>                index = </a:t>
+            </a:r>
+            <a:r>
+              <a:rPr kumimoji="0" lang="en-US" altLang="en-US" sz="1100" b="1" i="0" u="none" strike="noStrike" cap="none" normalizeH="0" baseline="0" dirty="0" err="1">
+                <a:ln>
+                  <a:noFill/>
+                </a:ln>
+                <a:solidFill>
+                  <a:srgbClr val="A9B7C6"/>
+                </a:solidFill>
+                <a:effectLst/>
+                <a:latin typeface="JetBrains Mono"/>
+              </a:rPr>
+              <a:t>cursor.getColumnIndex</a:t>
+            </a:r>
+            <a:r>
+              <a:rPr kumimoji="0" lang="en-US" altLang="en-US" sz="1100" b="1" i="0" u="none" strike="noStrike" cap="none" normalizeH="0" baseline="0" dirty="0">
+                <a:ln>
+                  <a:noFill/>
+                </a:ln>
+                <a:solidFill>
+                  <a:srgbClr val="A9B7C6"/>
+                </a:solidFill>
+                <a:effectLst/>
+                <a:latin typeface="JetBrains Mono"/>
+              </a:rPr>
+              <a:t>(columns[</a:t>
+            </a:r>
+            <a:r>
+              <a:rPr kumimoji="0" lang="en-US" altLang="en-US" sz="1100" b="1" i="0" u="none" strike="noStrike" cap="none" normalizeH="0" baseline="0" dirty="0" err="1">
+                <a:ln>
+                  <a:noFill/>
+                </a:ln>
+                <a:solidFill>
+                  <a:srgbClr val="A9B7C6"/>
+                </a:solidFill>
+                <a:effectLst/>
+                <a:latin typeface="JetBrains Mono"/>
+              </a:rPr>
+              <a:t>i</a:t>
+            </a:r>
+            <a:r>
+              <a:rPr kumimoji="0" lang="en-US" altLang="en-US" sz="1100" b="1" i="0" u="none" strike="noStrike" cap="none" normalizeH="0" baseline="0" dirty="0">
+                <a:ln>
+                  <a:noFill/>
+                </a:ln>
+                <a:solidFill>
+                  <a:srgbClr val="A9B7C6"/>
+                </a:solidFill>
+                <a:effectLst/>
+                <a:latin typeface="JetBrains Mono"/>
+              </a:rPr>
+              <a:t>])</a:t>
+            </a:r>
+            <a:r>
+              <a:rPr kumimoji="0" lang="en-US" altLang="en-US" sz="1100" b="1" i="0" u="none" strike="noStrike" cap="none" normalizeH="0" baseline="0" dirty="0">
+                <a:ln>
+                  <a:noFill/>
+                </a:ln>
+                <a:solidFill>
+                  <a:srgbClr val="CC7832"/>
+                </a:solidFill>
+                <a:effectLst/>
+                <a:latin typeface="JetBrains Mono"/>
+              </a:rPr>
+              <a:t>;</a:t>
+            </a:r>
+            <a:br>
+              <a:rPr kumimoji="0" lang="en-US" altLang="en-US" sz="1100" b="1" i="0" u="none" strike="noStrike" cap="none" normalizeH="0" baseline="0" dirty="0">
+                <a:ln>
+                  <a:noFill/>
+                </a:ln>
+                <a:solidFill>
+                  <a:srgbClr val="CC7832"/>
+                </a:solidFill>
+                <a:effectLst/>
+                <a:latin typeface="JetBrains Mono"/>
+              </a:rPr>
+            </a:br>
+            <a:r>
+              <a:rPr kumimoji="0" lang="en-US" altLang="en-US" sz="1100" b="1" i="0" u="none" strike="noStrike" cap="none" normalizeH="0" baseline="0" dirty="0">
+                <a:ln>
+                  <a:noFill/>
+                </a:ln>
+                <a:solidFill>
+                  <a:srgbClr val="CC7832"/>
+                </a:solidFill>
+                <a:effectLst/>
+                <a:latin typeface="JetBrains Mono"/>
+              </a:rPr>
+              <a:t>                </a:t>
+            </a:r>
+            <a:r>
+              <a:rPr kumimoji="0" lang="en-US" altLang="en-US" sz="1100" b="1" i="0" u="none" strike="noStrike" cap="none" normalizeH="0" baseline="0" dirty="0" err="1">
+                <a:ln>
+                  <a:noFill/>
+                </a:ln>
+                <a:solidFill>
+                  <a:srgbClr val="A9B7C6"/>
+                </a:solidFill>
+                <a:effectLst/>
+                <a:latin typeface="JetBrains Mono"/>
+              </a:rPr>
+              <a:t>stringBuffer.append</a:t>
+            </a:r>
+            <a:r>
+              <a:rPr kumimoji="0" lang="en-US" altLang="en-US" sz="1100" b="1" i="0" u="none" strike="noStrike" cap="none" normalizeH="0" baseline="0" dirty="0">
+                <a:ln>
+                  <a:noFill/>
+                </a:ln>
+                <a:solidFill>
+                  <a:srgbClr val="A9B7C6"/>
+                </a:solidFill>
+                <a:effectLst/>
+                <a:latin typeface="JetBrains Mono"/>
+              </a:rPr>
+              <a:t>(</a:t>
+            </a:r>
+            <a:r>
+              <a:rPr kumimoji="0" lang="en-US" altLang="en-US" sz="1100" b="1" i="0" u="none" strike="noStrike" cap="none" normalizeH="0" baseline="0" dirty="0" err="1">
+                <a:ln>
+                  <a:noFill/>
+                </a:ln>
+                <a:solidFill>
+                  <a:srgbClr val="A9B7C6"/>
+                </a:solidFill>
+                <a:effectLst/>
+                <a:latin typeface="JetBrains Mono"/>
+              </a:rPr>
+              <a:t>cursor.getString</a:t>
+            </a:r>
+            <a:r>
+              <a:rPr kumimoji="0" lang="en-US" altLang="en-US" sz="1100" b="1" i="0" u="none" strike="noStrike" cap="none" normalizeH="0" baseline="0" dirty="0">
+                <a:ln>
+                  <a:noFill/>
+                </a:ln>
+                <a:solidFill>
+                  <a:srgbClr val="A9B7C6"/>
+                </a:solidFill>
+                <a:effectLst/>
+                <a:latin typeface="JetBrains Mono"/>
+              </a:rPr>
+              <a:t>(index) + </a:t>
+            </a:r>
+            <a:r>
+              <a:rPr kumimoji="0" lang="en-US" altLang="en-US" sz="1100" b="1" i="0" u="none" strike="noStrike" cap="none" normalizeH="0" baseline="0" dirty="0">
+                <a:ln>
+                  <a:noFill/>
+                </a:ln>
+                <a:solidFill>
+                  <a:srgbClr val="6A8759"/>
+                </a:solidFill>
+                <a:effectLst/>
+                <a:latin typeface="JetBrains Mono"/>
+              </a:rPr>
+              <a:t>" "</a:t>
+            </a:r>
+            <a:r>
+              <a:rPr kumimoji="0" lang="en-US" altLang="en-US" sz="1100" b="1" i="0" u="none" strike="noStrike" cap="none" normalizeH="0" baseline="0" dirty="0">
+                <a:ln>
+                  <a:noFill/>
+                </a:ln>
+                <a:solidFill>
+                  <a:srgbClr val="A9B7C6"/>
+                </a:solidFill>
+                <a:effectLst/>
+                <a:latin typeface="JetBrains Mono"/>
+              </a:rPr>
+              <a:t>)</a:t>
+            </a:r>
+            <a:r>
+              <a:rPr kumimoji="0" lang="en-US" altLang="en-US" sz="1100" b="1" i="0" u="none" strike="noStrike" cap="none" normalizeH="0" baseline="0" dirty="0">
+                <a:ln>
+                  <a:noFill/>
+                </a:ln>
+                <a:solidFill>
+                  <a:srgbClr val="CC7832"/>
+                </a:solidFill>
+                <a:effectLst/>
+                <a:latin typeface="JetBrains Mono"/>
+              </a:rPr>
+              <a:t>;</a:t>
+            </a:r>
+            <a:br>
+              <a:rPr kumimoji="0" lang="en-US" altLang="en-US" sz="1100" b="1" i="0" u="none" strike="noStrike" cap="none" normalizeH="0" baseline="0" dirty="0">
+                <a:ln>
+                  <a:noFill/>
+                </a:ln>
+                <a:solidFill>
+                  <a:srgbClr val="CC7832"/>
+                </a:solidFill>
+                <a:effectLst/>
+                <a:latin typeface="JetBrains Mono"/>
+              </a:rPr>
+            </a:br>
+            <a:br>
+              <a:rPr kumimoji="0" lang="en-US" altLang="en-US" sz="1100" b="1" i="0" u="none" strike="noStrike" cap="none" normalizeH="0" baseline="0" dirty="0">
+                <a:ln>
+                  <a:noFill/>
+                </a:ln>
+                <a:solidFill>
+                  <a:srgbClr val="CC7832"/>
+                </a:solidFill>
+                <a:effectLst/>
+                <a:latin typeface="JetBrains Mono"/>
+              </a:rPr>
+            </a:br>
+            <a:r>
+              <a:rPr kumimoji="0" lang="en-US" altLang="en-US" sz="1100" b="1" i="0" u="none" strike="noStrike" cap="none" normalizeH="0" baseline="0" dirty="0">
+                <a:ln>
+                  <a:noFill/>
+                </a:ln>
+                <a:solidFill>
+                  <a:srgbClr val="CC7832"/>
+                </a:solidFill>
+                <a:effectLst/>
+                <a:latin typeface="JetBrains Mono"/>
+              </a:rPr>
+              <a:t>            </a:t>
+            </a:r>
+            <a:r>
+              <a:rPr kumimoji="0" lang="en-US" altLang="en-US" sz="1100" b="1" i="0" u="none" strike="noStrike" cap="none" normalizeH="0" baseline="0" dirty="0">
+                <a:ln>
+                  <a:noFill/>
+                </a:ln>
+                <a:solidFill>
+                  <a:srgbClr val="A9B7C6"/>
+                </a:solidFill>
+                <a:effectLst/>
+                <a:latin typeface="JetBrains Mono"/>
+              </a:rPr>
+              <a:t>}</a:t>
+            </a:r>
+            <a:br>
+              <a:rPr kumimoji="0" lang="en-US" altLang="en-US" sz="1100" b="1" i="0" u="none" strike="noStrike" cap="none" normalizeH="0" baseline="0" dirty="0">
+                <a:ln>
+                  <a:noFill/>
+                </a:ln>
+                <a:solidFill>
+                  <a:srgbClr val="A9B7C6"/>
+                </a:solidFill>
+                <a:effectLst/>
+                <a:latin typeface="JetBrains Mono"/>
+              </a:rPr>
+            </a:br>
+            <a:r>
+              <a:rPr kumimoji="0" lang="en-US" altLang="en-US" sz="1100" b="1" i="0" u="none" strike="noStrike" cap="none" normalizeH="0" baseline="0" dirty="0">
+                <a:ln>
+                  <a:noFill/>
+                </a:ln>
+                <a:solidFill>
+                  <a:srgbClr val="A9B7C6"/>
+                </a:solidFill>
+                <a:effectLst/>
+                <a:latin typeface="JetBrains Mono"/>
+              </a:rPr>
+              <a:t>            </a:t>
+            </a:r>
+            <a:r>
+              <a:rPr kumimoji="0" lang="en-US" altLang="en-US" sz="1100" b="1" i="0" u="none" strike="noStrike" cap="none" normalizeH="0" baseline="0" dirty="0" err="1">
+                <a:ln>
+                  <a:noFill/>
+                </a:ln>
+                <a:solidFill>
+                  <a:srgbClr val="A9B7C6"/>
+                </a:solidFill>
+                <a:effectLst/>
+                <a:latin typeface="JetBrains Mono"/>
+              </a:rPr>
+              <a:t>stringBuffer.append</a:t>
+            </a:r>
+            <a:r>
+              <a:rPr kumimoji="0" lang="en-US" altLang="en-US" sz="1100" b="1" i="0" u="none" strike="noStrike" cap="none" normalizeH="0" baseline="0" dirty="0">
+                <a:ln>
+                  <a:noFill/>
+                </a:ln>
+                <a:solidFill>
+                  <a:srgbClr val="A9B7C6"/>
+                </a:solidFill>
+                <a:effectLst/>
+                <a:latin typeface="JetBrains Mono"/>
+              </a:rPr>
+              <a:t>(</a:t>
+            </a:r>
+            <a:r>
+              <a:rPr kumimoji="0" lang="en-US" altLang="en-US" sz="1100" b="1" i="0" u="none" strike="noStrike" cap="none" normalizeH="0" baseline="0" dirty="0">
+                <a:ln>
+                  <a:noFill/>
+                </a:ln>
+                <a:solidFill>
+                  <a:srgbClr val="6A8759"/>
+                </a:solidFill>
+                <a:effectLst/>
+                <a:latin typeface="JetBrains Mono"/>
+              </a:rPr>
+              <a:t>"</a:t>
+            </a:r>
+            <a:r>
+              <a:rPr kumimoji="0" lang="en-US" altLang="en-US" sz="1100" b="1" i="0" u="none" strike="noStrike" cap="none" normalizeH="0" baseline="0" dirty="0">
+                <a:ln>
+                  <a:noFill/>
+                </a:ln>
+                <a:solidFill>
+                  <a:srgbClr val="CC7832"/>
+                </a:solidFill>
+                <a:effectLst/>
+                <a:latin typeface="JetBrains Mono"/>
+              </a:rPr>
+              <a:t>\n</a:t>
+            </a:r>
+            <a:r>
+              <a:rPr kumimoji="0" lang="en-US" altLang="en-US" sz="1100" b="1" i="0" u="none" strike="noStrike" cap="none" normalizeH="0" baseline="0" dirty="0">
+                <a:ln>
+                  <a:noFill/>
+                </a:ln>
+                <a:solidFill>
+                  <a:srgbClr val="6A8759"/>
+                </a:solidFill>
+                <a:effectLst/>
+                <a:latin typeface="JetBrains Mono"/>
+              </a:rPr>
+              <a:t>"</a:t>
+            </a:r>
+            <a:r>
+              <a:rPr kumimoji="0" lang="en-US" altLang="en-US" sz="1100" b="1" i="0" u="none" strike="noStrike" cap="none" normalizeH="0" baseline="0" dirty="0">
+                <a:ln>
+                  <a:noFill/>
+                </a:ln>
+                <a:solidFill>
+                  <a:srgbClr val="A9B7C6"/>
+                </a:solidFill>
+                <a:effectLst/>
+                <a:latin typeface="JetBrains Mono"/>
+              </a:rPr>
+              <a:t>)</a:t>
+            </a:r>
+            <a:r>
+              <a:rPr kumimoji="0" lang="en-US" altLang="en-US" sz="1100" b="1" i="0" u="none" strike="noStrike" cap="none" normalizeH="0" baseline="0" dirty="0">
+                <a:ln>
+                  <a:noFill/>
+                </a:ln>
+                <a:solidFill>
+                  <a:srgbClr val="CC7832"/>
+                </a:solidFill>
+                <a:effectLst/>
+                <a:latin typeface="JetBrains Mono"/>
+              </a:rPr>
+              <a:t>;</a:t>
+            </a:r>
+            <a:br>
+              <a:rPr kumimoji="0" lang="en-US" altLang="en-US" sz="1100" b="1" i="0" u="none" strike="noStrike" cap="none" normalizeH="0" baseline="0" dirty="0">
+                <a:ln>
+                  <a:noFill/>
+                </a:ln>
+                <a:solidFill>
+                  <a:srgbClr val="CC7832"/>
+                </a:solidFill>
+                <a:effectLst/>
+                <a:latin typeface="JetBrains Mono"/>
+              </a:rPr>
+            </a:br>
+            <a:r>
+              <a:rPr kumimoji="0" lang="en-US" altLang="en-US" sz="1100" b="1" i="0" u="none" strike="noStrike" cap="none" normalizeH="0" baseline="0" dirty="0">
+                <a:ln>
+                  <a:noFill/>
+                </a:ln>
+                <a:solidFill>
+                  <a:srgbClr val="CC7832"/>
+                </a:solidFill>
+                <a:effectLst/>
+                <a:latin typeface="JetBrains Mono"/>
+              </a:rPr>
+              <a:t>        </a:t>
+            </a:r>
+            <a:r>
+              <a:rPr kumimoji="0" lang="en-US" altLang="en-US" sz="1100" b="1" i="0" u="none" strike="noStrike" cap="none" normalizeH="0" baseline="0" dirty="0">
+                <a:ln>
+                  <a:noFill/>
+                </a:ln>
+                <a:solidFill>
+                  <a:srgbClr val="A9B7C6"/>
+                </a:solidFill>
+                <a:effectLst/>
+                <a:latin typeface="JetBrains Mono"/>
+              </a:rPr>
+              <a:t>}</a:t>
+            </a:r>
+            <a:br>
+              <a:rPr kumimoji="0" lang="en-US" altLang="en-US" sz="1100" b="1" i="0" u="none" strike="noStrike" cap="none" normalizeH="0" baseline="0" dirty="0">
+                <a:ln>
+                  <a:noFill/>
+                </a:ln>
+                <a:solidFill>
+                  <a:srgbClr val="A9B7C6"/>
+                </a:solidFill>
+                <a:effectLst/>
+                <a:latin typeface="JetBrains Mono"/>
+              </a:rPr>
+            </a:br>
+            <a:r>
+              <a:rPr kumimoji="0" lang="en-US" altLang="en-US" sz="1100" b="1" i="0" u="none" strike="noStrike" cap="none" normalizeH="0" baseline="0" dirty="0">
+                <a:ln>
+                  <a:noFill/>
+                </a:ln>
+                <a:solidFill>
+                  <a:srgbClr val="A9B7C6"/>
+                </a:solidFill>
+                <a:effectLst/>
+                <a:latin typeface="JetBrains Mono"/>
+              </a:rPr>
+              <a:t>    }</a:t>
+            </a:r>
+            <a:br>
+              <a:rPr kumimoji="0" lang="en-US" altLang="en-US" sz="1100" b="1" i="0" u="none" strike="noStrike" cap="none" normalizeH="0" baseline="0" dirty="0">
+                <a:ln>
+                  <a:noFill/>
+                </a:ln>
+                <a:solidFill>
+                  <a:srgbClr val="A9B7C6"/>
+                </a:solidFill>
+                <a:effectLst/>
+                <a:latin typeface="JetBrains Mono"/>
+              </a:rPr>
+            </a:br>
+            <a:r>
+              <a:rPr kumimoji="0" lang="en-US" altLang="en-US" sz="1100" b="1" i="0" u="none" strike="noStrike" cap="none" normalizeH="0" baseline="0" dirty="0">
+                <a:ln>
+                  <a:noFill/>
+                </a:ln>
+                <a:solidFill>
+                  <a:srgbClr val="A9B7C6"/>
+                </a:solidFill>
+                <a:effectLst/>
+                <a:latin typeface="JetBrains Mono"/>
+              </a:rPr>
+              <a:t>    </a:t>
+            </a:r>
+            <a:r>
+              <a:rPr kumimoji="0" lang="en-US" altLang="en-US" sz="1100" b="1" i="0" u="none" strike="noStrike" cap="none" normalizeH="0" baseline="0" dirty="0">
+                <a:ln>
+                  <a:noFill/>
+                </a:ln>
+                <a:solidFill>
+                  <a:srgbClr val="CC7832"/>
+                </a:solidFill>
+                <a:effectLst/>
+                <a:latin typeface="JetBrains Mono"/>
+              </a:rPr>
+              <a:t>else</a:t>
+            </a:r>
+            <a:br>
+              <a:rPr kumimoji="0" lang="en-US" altLang="en-US" sz="1100" b="1" i="0" u="none" strike="noStrike" cap="none" normalizeH="0" baseline="0" dirty="0">
+                <a:ln>
+                  <a:noFill/>
+                </a:ln>
+                <a:solidFill>
+                  <a:srgbClr val="CC7832"/>
+                </a:solidFill>
+                <a:effectLst/>
+                <a:latin typeface="JetBrains Mono"/>
+              </a:rPr>
+            </a:br>
+            <a:r>
+              <a:rPr kumimoji="0" lang="en-US" altLang="en-US" sz="1100" b="1" i="0" u="none" strike="noStrike" cap="none" normalizeH="0" baseline="0" dirty="0">
+                <a:ln>
+                  <a:noFill/>
+                </a:ln>
+                <a:solidFill>
+                  <a:srgbClr val="CC7832"/>
+                </a:solidFill>
+                <a:effectLst/>
+                <a:latin typeface="JetBrains Mono"/>
+              </a:rPr>
+              <a:t>    </a:t>
+            </a:r>
+            <a:r>
+              <a:rPr kumimoji="0" lang="en-US" altLang="en-US" sz="1100" b="1" i="0" u="none" strike="noStrike" cap="none" normalizeH="0" baseline="0" dirty="0">
+                <a:ln>
+                  <a:noFill/>
+                </a:ln>
+                <a:solidFill>
+                  <a:srgbClr val="A9B7C6"/>
+                </a:solidFill>
+                <a:effectLst/>
+                <a:latin typeface="JetBrains Mono"/>
+              </a:rPr>
+              <a:t>{</a:t>
+            </a:r>
+            <a:br>
+              <a:rPr kumimoji="0" lang="en-US" altLang="en-US" sz="1100" b="1" i="0" u="none" strike="noStrike" cap="none" normalizeH="0" baseline="0" dirty="0">
+                <a:ln>
+                  <a:noFill/>
+                </a:ln>
+                <a:solidFill>
+                  <a:srgbClr val="A9B7C6"/>
+                </a:solidFill>
+                <a:effectLst/>
+                <a:latin typeface="JetBrains Mono"/>
+              </a:rPr>
+            </a:br>
+            <a:r>
+              <a:rPr kumimoji="0" lang="en-US" altLang="en-US" sz="1100" b="1" i="0" u="none" strike="noStrike" cap="none" normalizeH="0" baseline="0" dirty="0">
+                <a:ln>
+                  <a:noFill/>
+                </a:ln>
+                <a:solidFill>
+                  <a:srgbClr val="A9B7C6"/>
+                </a:solidFill>
+                <a:effectLst/>
+                <a:latin typeface="JetBrains Mono"/>
+              </a:rPr>
+              <a:t>        </a:t>
+            </a:r>
+            <a:r>
+              <a:rPr kumimoji="0" lang="en-US" altLang="en-US" sz="1100" b="1" i="0" u="none" strike="noStrike" cap="none" normalizeH="0" baseline="0" dirty="0" err="1">
+                <a:ln>
+                  <a:noFill/>
+                </a:ln>
+                <a:solidFill>
+                  <a:srgbClr val="A9B7C6"/>
+                </a:solidFill>
+                <a:effectLst/>
+                <a:latin typeface="JetBrains Mono"/>
+              </a:rPr>
+              <a:t>Toast.</a:t>
+            </a:r>
+            <a:r>
+              <a:rPr kumimoji="0" lang="en-US" altLang="en-US" sz="1100" b="1" i="1" u="none" strike="noStrike" cap="none" normalizeH="0" baseline="0" dirty="0" err="1">
+                <a:ln>
+                  <a:noFill/>
+                </a:ln>
+                <a:solidFill>
+                  <a:srgbClr val="A9B7C6"/>
+                </a:solidFill>
+                <a:effectLst/>
+                <a:latin typeface="JetBrains Mono"/>
+              </a:rPr>
+              <a:t>makeText</a:t>
+            </a:r>
+            <a:r>
+              <a:rPr kumimoji="0" lang="en-US" altLang="en-US" sz="1100" b="1" i="0" u="none" strike="noStrike" cap="none" normalizeH="0" baseline="0" dirty="0">
+                <a:ln>
+                  <a:noFill/>
+                </a:ln>
+                <a:solidFill>
+                  <a:srgbClr val="A9B7C6"/>
+                </a:solidFill>
+                <a:effectLst/>
+                <a:latin typeface="JetBrains Mono"/>
+              </a:rPr>
+              <a:t>(</a:t>
+            </a:r>
+            <a:r>
+              <a:rPr kumimoji="0" lang="en-US" altLang="en-US" sz="1100" b="1" i="0" u="none" strike="noStrike" cap="none" normalizeH="0" baseline="0" dirty="0" err="1">
+                <a:ln>
+                  <a:noFill/>
+                </a:ln>
+                <a:solidFill>
+                  <a:srgbClr val="9876AA"/>
+                </a:solidFill>
+                <a:effectLst/>
+                <a:latin typeface="JetBrains Mono"/>
+              </a:rPr>
+              <a:t>context</a:t>
+            </a:r>
+            <a:r>
+              <a:rPr kumimoji="0" lang="en-US" altLang="en-US" sz="1100" b="1" i="0" u="none" strike="noStrike" cap="none" normalizeH="0" baseline="0" dirty="0" err="1">
+                <a:ln>
+                  <a:noFill/>
+                </a:ln>
+                <a:solidFill>
+                  <a:srgbClr val="CC7832"/>
+                </a:solidFill>
+                <a:effectLst/>
+                <a:latin typeface="JetBrains Mono"/>
+              </a:rPr>
+              <a:t>,</a:t>
+            </a:r>
+            <a:r>
+              <a:rPr kumimoji="0" lang="en-US" altLang="en-US" sz="1100" b="1" i="0" u="none" strike="noStrike" cap="none" normalizeH="0" baseline="0" dirty="0" err="1">
+                <a:ln>
+                  <a:noFill/>
+                </a:ln>
+                <a:solidFill>
+                  <a:srgbClr val="6A8759"/>
+                </a:solidFill>
+                <a:effectLst/>
+                <a:latin typeface="JetBrains Mono"/>
+              </a:rPr>
+              <a:t>"empty</a:t>
+            </a:r>
+            <a:r>
+              <a:rPr kumimoji="0" lang="en-US" altLang="en-US" sz="1100" b="1" i="0" u="none" strike="noStrike" cap="none" normalizeH="0" baseline="0" dirty="0">
+                <a:ln>
+                  <a:noFill/>
+                </a:ln>
+                <a:solidFill>
+                  <a:srgbClr val="6A8759"/>
+                </a:solidFill>
+                <a:effectLst/>
+                <a:latin typeface="JetBrains Mono"/>
+              </a:rPr>
+              <a:t> Database"</a:t>
+            </a:r>
+            <a:r>
+              <a:rPr kumimoji="0" lang="en-US" altLang="en-US" sz="1100" b="1" i="0" u="none" strike="noStrike" cap="none" normalizeH="0" baseline="0" dirty="0">
+                <a:ln>
+                  <a:noFill/>
+                </a:ln>
+                <a:solidFill>
+                  <a:srgbClr val="CC7832"/>
+                </a:solidFill>
+                <a:effectLst/>
+                <a:latin typeface="JetBrains Mono"/>
+              </a:rPr>
+              <a:t>,</a:t>
+            </a:r>
+            <a:r>
+              <a:rPr kumimoji="0" lang="en-US" altLang="en-US" sz="1100" b="1" i="0" u="none" strike="noStrike" cap="none" normalizeH="0" baseline="0" dirty="0" err="1">
+                <a:ln>
+                  <a:noFill/>
+                </a:ln>
+                <a:solidFill>
+                  <a:srgbClr val="A9B7C6"/>
+                </a:solidFill>
+                <a:effectLst/>
+                <a:latin typeface="JetBrains Mono"/>
+              </a:rPr>
+              <a:t>Toast.</a:t>
+            </a:r>
+            <a:r>
+              <a:rPr kumimoji="0" lang="en-US" altLang="en-US" sz="1100" b="1" i="1" u="none" strike="noStrike" cap="none" normalizeH="0" baseline="0" dirty="0" err="1">
+                <a:ln>
+                  <a:noFill/>
+                </a:ln>
+                <a:solidFill>
+                  <a:srgbClr val="9876AA"/>
+                </a:solidFill>
+                <a:effectLst/>
+                <a:latin typeface="JetBrains Mono"/>
+              </a:rPr>
+              <a:t>LENGTH_SHORT</a:t>
+            </a:r>
+            <a:r>
+              <a:rPr kumimoji="0" lang="en-US" altLang="en-US" sz="1100" b="1" i="0" u="none" strike="noStrike" cap="none" normalizeH="0" baseline="0" dirty="0">
+                <a:ln>
+                  <a:noFill/>
+                </a:ln>
+                <a:solidFill>
+                  <a:srgbClr val="A9B7C6"/>
+                </a:solidFill>
+                <a:effectLst/>
+                <a:latin typeface="JetBrains Mono"/>
+              </a:rPr>
+              <a:t>).show()</a:t>
+            </a:r>
+            <a:r>
+              <a:rPr kumimoji="0" lang="en-US" altLang="en-US" sz="1100" b="1" i="0" u="none" strike="noStrike" cap="none" normalizeH="0" baseline="0" dirty="0">
+                <a:ln>
+                  <a:noFill/>
+                </a:ln>
+                <a:solidFill>
+                  <a:srgbClr val="CC7832"/>
+                </a:solidFill>
+                <a:effectLst/>
+                <a:latin typeface="JetBrains Mono"/>
+              </a:rPr>
+              <a:t>;</a:t>
+            </a:r>
+            <a:br>
+              <a:rPr kumimoji="0" lang="en-US" altLang="en-US" sz="1100" b="1" i="0" u="none" strike="noStrike" cap="none" normalizeH="0" baseline="0" dirty="0">
+                <a:ln>
+                  <a:noFill/>
+                </a:ln>
+                <a:solidFill>
+                  <a:srgbClr val="CC7832"/>
+                </a:solidFill>
+                <a:effectLst/>
+                <a:latin typeface="JetBrains Mono"/>
+              </a:rPr>
+            </a:br>
+            <a:br>
+              <a:rPr kumimoji="0" lang="en-US" altLang="en-US" sz="1100" b="1" i="0" u="none" strike="noStrike" cap="none" normalizeH="0" baseline="0" dirty="0">
+                <a:ln>
+                  <a:noFill/>
+                </a:ln>
+                <a:solidFill>
+                  <a:srgbClr val="CC7832"/>
+                </a:solidFill>
+                <a:effectLst/>
+                <a:latin typeface="JetBrains Mono"/>
+              </a:rPr>
+            </a:br>
+            <a:r>
+              <a:rPr kumimoji="0" lang="en-US" altLang="en-US" sz="1100" b="1" i="0" u="none" strike="noStrike" cap="none" normalizeH="0" baseline="0" dirty="0">
+                <a:ln>
+                  <a:noFill/>
+                </a:ln>
+                <a:solidFill>
+                  <a:srgbClr val="CC7832"/>
+                </a:solidFill>
+                <a:effectLst/>
+                <a:latin typeface="JetBrains Mono"/>
+              </a:rPr>
+              <a:t>    </a:t>
+            </a:r>
+            <a:r>
+              <a:rPr kumimoji="0" lang="en-US" altLang="en-US" sz="1100" b="1" i="0" u="none" strike="noStrike" cap="none" normalizeH="0" baseline="0" dirty="0">
+                <a:ln>
+                  <a:noFill/>
+                </a:ln>
+                <a:solidFill>
+                  <a:srgbClr val="A9B7C6"/>
+                </a:solidFill>
+                <a:effectLst/>
+                <a:latin typeface="JetBrains Mono"/>
+              </a:rPr>
+              <a:t>}</a:t>
+            </a:r>
+            <a:br>
+              <a:rPr kumimoji="0" lang="en-US" altLang="en-US" sz="1100" b="1" i="0" u="none" strike="noStrike" cap="none" normalizeH="0" baseline="0" dirty="0">
+                <a:ln>
+                  <a:noFill/>
+                </a:ln>
+                <a:solidFill>
+                  <a:srgbClr val="A9B7C6"/>
+                </a:solidFill>
+                <a:effectLst/>
+                <a:latin typeface="JetBrains Mono"/>
+              </a:rPr>
+            </a:br>
+            <a:r>
+              <a:rPr kumimoji="0" lang="en-US" altLang="en-US" sz="1100" b="1" i="0" u="none" strike="noStrike" cap="none" normalizeH="0" baseline="0" dirty="0">
+                <a:ln>
+                  <a:noFill/>
+                </a:ln>
+                <a:solidFill>
+                  <a:srgbClr val="A9B7C6"/>
+                </a:solidFill>
+                <a:effectLst/>
+                <a:latin typeface="JetBrains Mono"/>
+              </a:rPr>
+              <a:t>    </a:t>
+            </a:r>
+            <a:r>
+              <a:rPr kumimoji="0" lang="en-US" altLang="en-US" sz="1100" b="1" i="0" u="none" strike="noStrike" cap="none" normalizeH="0" baseline="0" dirty="0">
+                <a:ln>
+                  <a:noFill/>
+                </a:ln>
+                <a:solidFill>
+                  <a:srgbClr val="CC7832"/>
+                </a:solidFill>
+                <a:effectLst/>
+                <a:latin typeface="JetBrains Mono"/>
+              </a:rPr>
+              <a:t>return </a:t>
+            </a:r>
+            <a:r>
+              <a:rPr kumimoji="0" lang="en-US" altLang="en-US" sz="1100" b="1" i="0" u="none" strike="noStrike" cap="none" normalizeH="0" baseline="0" dirty="0" err="1">
+                <a:ln>
+                  <a:noFill/>
+                </a:ln>
+                <a:solidFill>
+                  <a:srgbClr val="A9B7C6"/>
+                </a:solidFill>
+                <a:effectLst/>
+                <a:latin typeface="JetBrains Mono"/>
+              </a:rPr>
+              <a:t>stringBuffer.toString</a:t>
+            </a:r>
+            <a:r>
+              <a:rPr kumimoji="0" lang="en-US" altLang="en-US" sz="1100" b="1" i="0" u="none" strike="noStrike" cap="none" normalizeH="0" baseline="0" dirty="0">
+                <a:ln>
+                  <a:noFill/>
+                </a:ln>
+                <a:solidFill>
+                  <a:srgbClr val="A9B7C6"/>
+                </a:solidFill>
+                <a:effectLst/>
+                <a:latin typeface="JetBrains Mono"/>
+              </a:rPr>
+              <a:t>()</a:t>
+            </a:r>
+            <a:r>
+              <a:rPr kumimoji="0" lang="en-US" altLang="en-US" sz="1100" b="1" i="0" u="none" strike="noStrike" cap="none" normalizeH="0" baseline="0" dirty="0">
+                <a:ln>
+                  <a:noFill/>
+                </a:ln>
+                <a:solidFill>
+                  <a:srgbClr val="CC7832"/>
+                </a:solidFill>
+                <a:effectLst/>
+                <a:latin typeface="JetBrains Mono"/>
+              </a:rPr>
+              <a:t>; </a:t>
+            </a:r>
+            <a:r>
+              <a:rPr kumimoji="0" lang="en-US" altLang="en-US" sz="1100" b="1" i="0" u="none" strike="noStrike" cap="none" normalizeH="0" baseline="0" dirty="0">
+                <a:ln>
+                  <a:noFill/>
+                </a:ln>
+                <a:solidFill>
+                  <a:srgbClr val="A9B7C6"/>
+                </a:solidFill>
+                <a:effectLst/>
+                <a:latin typeface="JetBrains Mono"/>
+              </a:rPr>
+              <a:t>}</a:t>
+            </a:r>
+            <a:endParaRPr kumimoji="0" lang="en-US" altLang="en-US" sz="2400" b="1" i="0" u="none" strike="noStrike" cap="none" normalizeH="0" baseline="0" dirty="0">
+              <a:ln>
+                <a:noFill/>
+              </a:ln>
+              <a:effectLst/>
+              <a:latin typeface="Arial" panose="020B0604020202020204" pitchFamily="34" charset="0"/>
+            </a:endParaRPr>
+          </a:p>
+        </p:txBody>
+      </p:sp>
+    </p:spTree>
+    <p:extLst>
+      <p:ext uri="{BB962C8B-B14F-4D97-AF65-F5344CB8AC3E}">
+        <p14:creationId xmlns:p14="http://schemas.microsoft.com/office/powerpoint/2010/main" val="2631244774"/>
+      </p:ext>
+    </p:extLst>
+  </p:cSld>
+  <p:clrMapOvr>
+    <a:masterClrMapping/>
+  </p:clrMapOvr>
+</p:sld>
+</file>
+
+<file path=ppt/slides/slide44.xml><?xml version="1.0" encoding="utf-8"?>
+<p:sld xmlns:a="http://schemas.openxmlformats.org/drawingml/2006/main" xmlns:r="http://schemas.openxmlformats.org/officeDocument/2006/relationships" xmlns:p="http://schemas.openxmlformats.org/presentationml/2006/main">
+  <p:cSld>
+    <p:spTree>
+      <p:nvGrpSpPr>
+        <p:cNvPr id="1" name=""/>
+        <p:cNvGrpSpPr/>
+        <p:nvPr/>
+      </p:nvGrpSpPr>
+      <p:grpSpPr>
+        <a:xfrm>
+          <a:off x="0" y="0"/>
+          <a:ext cx="0" cy="0"/>
+          <a:chOff x="0" y="0"/>
+          <a:chExt cx="0" cy="0"/>
+        </a:xfrm>
+      </p:grpSpPr>
+      <p:sp>
+        <p:nvSpPr>
+          <p:cNvPr id="2" name="Titolo 1">
+            <a:extLst>
+              <a:ext uri="{FF2B5EF4-FFF2-40B4-BE49-F238E27FC236}">
+                <a16:creationId xmlns:a16="http://schemas.microsoft.com/office/drawing/2014/main" id="{7AC1B4C0-9784-0F41-A3BE-2ACCC2426501}"/>
+              </a:ext>
+            </a:extLst>
+          </p:cNvPr>
+          <p:cNvSpPr>
+            <a:spLocks noGrp="1"/>
+          </p:cNvSpPr>
+          <p:nvPr>
+            <p:ph type="title"/>
+          </p:nvPr>
+        </p:nvSpPr>
+        <p:spPr/>
+        <p:txBody>
+          <a:bodyPr/>
+          <a:lstStyle/>
+          <a:p>
+            <a:r>
+              <a:rPr lang="en-US" dirty="0"/>
+              <a:t>Update Data</a:t>
+            </a:r>
+          </a:p>
+        </p:txBody>
+      </p:sp>
+      <p:sp>
+        <p:nvSpPr>
+          <p:cNvPr id="3" name="Segnaposto contenuto 2">
+            <a:extLst>
+              <a:ext uri="{FF2B5EF4-FFF2-40B4-BE49-F238E27FC236}">
+                <a16:creationId xmlns:a16="http://schemas.microsoft.com/office/drawing/2014/main" id="{85B3A8E5-7D4B-600A-F107-F48C7653392A}"/>
+              </a:ext>
+            </a:extLst>
+          </p:cNvPr>
+          <p:cNvSpPr>
+            <a:spLocks noGrp="1"/>
+          </p:cNvSpPr>
+          <p:nvPr>
+            <p:ph idx="1"/>
+          </p:nvPr>
+        </p:nvSpPr>
+        <p:spPr/>
+        <p:txBody>
+          <a:bodyPr/>
+          <a:lstStyle/>
+          <a:p>
+            <a:endParaRPr lang="en-US"/>
+          </a:p>
+        </p:txBody>
+      </p:sp>
+    </p:spTree>
+    <p:extLst>
+      <p:ext uri="{BB962C8B-B14F-4D97-AF65-F5344CB8AC3E}">
+        <p14:creationId xmlns:p14="http://schemas.microsoft.com/office/powerpoint/2010/main" val="1573973177"/>
       </p:ext>
     </p:extLst>
   </p:cSld>

</xml_diff>